<commit_message>
feat: change to sidecite, add derivations
</commit_message>
<xml_diff>
--- a/ANN/images/hhg-jablonski.pptx
+++ b/ANN/images/hhg-jablonski.pptx
@@ -104,7 +104,121 @@
       </a:defRPr>
     </a:lvl9pPr>
   </p:defaultTextStyle>
+  <p:extLst>
+    <p:ext uri="{EFAFB233-063F-42B5-8137-9DF3F51BA10A}">
+      <p15:sldGuideLst xmlns:p15="http://schemas.microsoft.com/office/powerpoint/2012/main"/>
+    </p:ext>
+  </p:extLst>
 </p:presentation>
+</file>
+
+<file path=ppt/revisionInfo.xml><?xml version="1.0" encoding="utf-8"?>
+<p1510:revInfo xmlns:a="http://schemas.openxmlformats.org/drawingml/2006/main" xmlns:r="http://schemas.openxmlformats.org/officeDocument/2006/relationships" xmlns:p1510="http://schemas.microsoft.com/office/powerpoint/2015/10/main">
+  <p1510:revLst>
+    <p1510:client id="{DAA904B9-2741-4030-8609-C1B53688A9CE}" v="3" dt="2023-06-15T12:22:26.726"/>
+  </p1510:revLst>
+</p1510:revInfo>
+</file>
+
+<file path=ppt/changesInfos/changesInfo1.xml><?xml version="1.0" encoding="utf-8"?>
+<pc:chgInfo xmlns:a="http://schemas.openxmlformats.org/drawingml/2006/main" xmlns:r="http://schemas.openxmlformats.org/officeDocument/2006/relationships" xmlns:ac="http://schemas.microsoft.com/office/drawing/2013/main/command" xmlns:pc="http://schemas.microsoft.com/office/powerpoint/2013/main/command">
+  <pc:docChgLst>
+    <pc:chgData name="Siem de Jong" userId="817426ff-5c22-48c8-8185-15e0c82acc00" providerId="ADAL" clId="{DAA904B9-2741-4030-8609-C1B53688A9CE}"/>
+    <pc:docChg chg="custSel modSld">
+      <pc:chgData name="Siem de Jong" userId="817426ff-5c22-48c8-8185-15e0c82acc00" providerId="ADAL" clId="{DAA904B9-2741-4030-8609-C1B53688A9CE}" dt="2023-06-15T12:22:26.725" v="16" actId="164"/>
+      <pc:docMkLst>
+        <pc:docMk/>
+      </pc:docMkLst>
+      <pc:sldChg chg="addSp delSp modSp mod">
+        <pc:chgData name="Siem de Jong" userId="817426ff-5c22-48c8-8185-15e0c82acc00" providerId="ADAL" clId="{DAA904B9-2741-4030-8609-C1B53688A9CE}" dt="2023-06-15T12:22:26.725" v="16" actId="164"/>
+        <pc:sldMkLst>
+          <pc:docMk/>
+          <pc:sldMk cId="1430434807" sldId="256"/>
+        </pc:sldMkLst>
+        <pc:spChg chg="add mod ord">
+          <ac:chgData name="Siem de Jong" userId="817426ff-5c22-48c8-8185-15e0c82acc00" providerId="ADAL" clId="{DAA904B9-2741-4030-8609-C1B53688A9CE}" dt="2023-06-15T12:22:26.725" v="16" actId="164"/>
+          <ac:spMkLst>
+            <pc:docMk/>
+            <pc:sldMk cId="1430434807" sldId="256"/>
+            <ac:spMk id="2" creationId="{0865C89D-F39A-85F9-06D0-0A4D3E97ABAB}"/>
+          </ac:spMkLst>
+        </pc:spChg>
+        <pc:spChg chg="add mod ord">
+          <ac:chgData name="Siem de Jong" userId="817426ff-5c22-48c8-8185-15e0c82acc00" providerId="ADAL" clId="{DAA904B9-2741-4030-8609-C1B53688A9CE}" dt="2023-06-15T12:22:26.725" v="16" actId="164"/>
+          <ac:spMkLst>
+            <pc:docMk/>
+            <pc:sldMk cId="1430434807" sldId="256"/>
+            <ac:spMk id="3" creationId="{9832670E-56BA-14AB-30F3-AEEE1C3A56AC}"/>
+          </ac:spMkLst>
+        </pc:spChg>
+        <pc:spChg chg="add mod ord">
+          <ac:chgData name="Siem de Jong" userId="817426ff-5c22-48c8-8185-15e0c82acc00" providerId="ADAL" clId="{DAA904B9-2741-4030-8609-C1B53688A9CE}" dt="2023-06-15T12:22:26.725" v="16" actId="164"/>
+          <ac:spMkLst>
+            <pc:docMk/>
+            <pc:sldMk cId="1430434807" sldId="256"/>
+            <ac:spMk id="6" creationId="{EB2B5735-4008-69B7-5FC8-A884FD3C06CC}"/>
+          </ac:spMkLst>
+        </pc:spChg>
+        <pc:spChg chg="add mod ord">
+          <ac:chgData name="Siem de Jong" userId="817426ff-5c22-48c8-8185-15e0c82acc00" providerId="ADAL" clId="{DAA904B9-2741-4030-8609-C1B53688A9CE}" dt="2023-06-15T12:22:26.725" v="16" actId="164"/>
+          <ac:spMkLst>
+            <pc:docMk/>
+            <pc:sldMk cId="1430434807" sldId="256"/>
+            <ac:spMk id="7" creationId="{FE3376B0-686B-7573-1659-831A510254C6}"/>
+          </ac:spMkLst>
+        </pc:spChg>
+        <pc:spChg chg="add del mod">
+          <ac:chgData name="Siem de Jong" userId="817426ff-5c22-48c8-8185-15e0c82acc00" providerId="ADAL" clId="{DAA904B9-2741-4030-8609-C1B53688A9CE}" dt="2023-06-15T12:22:14.920" v="15"/>
+          <ac:spMkLst>
+            <pc:docMk/>
+            <pc:sldMk cId="1430434807" sldId="256"/>
+            <ac:spMk id="12" creationId="{C23E09CC-AF54-15E4-CF2E-3AFF2A1FF30A}"/>
+          </ac:spMkLst>
+        </pc:spChg>
+        <pc:grpChg chg="add mod">
+          <ac:chgData name="Siem de Jong" userId="817426ff-5c22-48c8-8185-15e0c82acc00" providerId="ADAL" clId="{DAA904B9-2741-4030-8609-C1B53688A9CE}" dt="2023-06-15T12:22:26.725" v="16" actId="164"/>
+          <ac:grpSpMkLst>
+            <pc:docMk/>
+            <pc:sldMk cId="1430434807" sldId="256"/>
+            <ac:grpSpMk id="13" creationId="{B44313DD-451F-8F2E-BFC2-F41AD92B4D2D}"/>
+          </ac:grpSpMkLst>
+        </pc:grpChg>
+        <pc:grpChg chg="mod">
+          <ac:chgData name="Siem de Jong" userId="817426ff-5c22-48c8-8185-15e0c82acc00" providerId="ADAL" clId="{DAA904B9-2741-4030-8609-C1B53688A9CE}" dt="2023-06-15T12:22:26.725" v="16" actId="164"/>
+          <ac:grpSpMkLst>
+            <pc:docMk/>
+            <pc:sldMk cId="1430434807" sldId="256"/>
+            <ac:grpSpMk id="59" creationId="{C1046AAF-A559-CF06-85B1-AB9623869F80}"/>
+          </ac:grpSpMkLst>
+        </pc:grpChg>
+        <pc:cxnChg chg="del">
+          <ac:chgData name="Siem de Jong" userId="817426ff-5c22-48c8-8185-15e0c82acc00" providerId="ADAL" clId="{DAA904B9-2741-4030-8609-C1B53688A9CE}" dt="2023-06-15T12:20:39.214" v="2" actId="478"/>
+          <ac:cxnSpMkLst>
+            <pc:docMk/>
+            <pc:sldMk cId="1430434807" sldId="256"/>
+            <ac:cxnSpMk id="46" creationId="{A1C16807-AC7C-653D-2B29-19D36C2BF8A0}"/>
+          </ac:cxnSpMkLst>
+        </pc:cxnChg>
+        <pc:cxnChg chg="del">
+          <ac:chgData name="Siem de Jong" userId="817426ff-5c22-48c8-8185-15e0c82acc00" providerId="ADAL" clId="{DAA904B9-2741-4030-8609-C1B53688A9CE}" dt="2023-06-15T12:20:46.961" v="4" actId="478"/>
+          <ac:cxnSpMkLst>
+            <pc:docMk/>
+            <pc:sldMk cId="1430434807" sldId="256"/>
+            <ac:cxnSpMk id="47" creationId="{329C7C3D-0960-EB88-F4AD-D61E10E25910}"/>
+          </ac:cxnSpMkLst>
+        </pc:cxnChg>
+        <pc:cxnChg chg="mod">
+          <ac:chgData name="Siem de Jong" userId="817426ff-5c22-48c8-8185-15e0c82acc00" providerId="ADAL" clId="{DAA904B9-2741-4030-8609-C1B53688A9CE}" dt="2023-06-15T12:21:57.229" v="10" actId="14100"/>
+          <ac:cxnSpMkLst>
+            <pc:docMk/>
+            <pc:sldMk cId="1430434807" sldId="256"/>
+            <ac:cxnSpMk id="49" creationId="{C679ABFB-0C69-98C4-232E-ADC69710A336}"/>
+          </ac:cxnSpMkLst>
+        </pc:cxnChg>
+      </pc:sldChg>
+    </pc:docChg>
+  </pc:docChgLst>
+</pc:chgInfo>
 </file>
 
 <file path=ppt/slideLayouts/slideLayout1.xml><?xml version="1.0" encoding="utf-8"?>
@@ -256,7 +370,7 @@
           <a:p>
             <a:fld id="{153CC46C-119B-4506-9A6D-47CA46A40AA4}" type="datetimeFigureOut">
               <a:rPr lang="en-GB" smtClean="0"/>
-              <a:t>14/06/2023</a:t>
+              <a:t>15/06/2023</a:t>
             </a:fld>
             <a:endParaRPr lang="en-GB"/>
           </a:p>
@@ -456,7 +570,7 @@
           <a:p>
             <a:fld id="{153CC46C-119B-4506-9A6D-47CA46A40AA4}" type="datetimeFigureOut">
               <a:rPr lang="en-GB" smtClean="0"/>
-              <a:t>14/06/2023</a:t>
+              <a:t>15/06/2023</a:t>
             </a:fld>
             <a:endParaRPr lang="en-GB"/>
           </a:p>
@@ -666,7 +780,7 @@
           <a:p>
             <a:fld id="{153CC46C-119B-4506-9A6D-47CA46A40AA4}" type="datetimeFigureOut">
               <a:rPr lang="en-GB" smtClean="0"/>
-              <a:t>14/06/2023</a:t>
+              <a:t>15/06/2023</a:t>
             </a:fld>
             <a:endParaRPr lang="en-GB"/>
           </a:p>
@@ -866,7 +980,7 @@
           <a:p>
             <a:fld id="{153CC46C-119B-4506-9A6D-47CA46A40AA4}" type="datetimeFigureOut">
               <a:rPr lang="en-GB" smtClean="0"/>
-              <a:t>14/06/2023</a:t>
+              <a:t>15/06/2023</a:t>
             </a:fld>
             <a:endParaRPr lang="en-GB"/>
           </a:p>
@@ -1142,7 +1256,7 @@
           <a:p>
             <a:fld id="{153CC46C-119B-4506-9A6D-47CA46A40AA4}" type="datetimeFigureOut">
               <a:rPr lang="en-GB" smtClean="0"/>
-              <a:t>14/06/2023</a:t>
+              <a:t>15/06/2023</a:t>
             </a:fld>
             <a:endParaRPr lang="en-GB"/>
           </a:p>
@@ -1410,7 +1524,7 @@
           <a:p>
             <a:fld id="{153CC46C-119B-4506-9A6D-47CA46A40AA4}" type="datetimeFigureOut">
               <a:rPr lang="en-GB" smtClean="0"/>
-              <a:t>14/06/2023</a:t>
+              <a:t>15/06/2023</a:t>
             </a:fld>
             <a:endParaRPr lang="en-GB"/>
           </a:p>
@@ -1825,7 +1939,7 @@
           <a:p>
             <a:fld id="{153CC46C-119B-4506-9A6D-47CA46A40AA4}" type="datetimeFigureOut">
               <a:rPr lang="en-GB" smtClean="0"/>
-              <a:t>14/06/2023</a:t>
+              <a:t>15/06/2023</a:t>
             </a:fld>
             <a:endParaRPr lang="en-GB"/>
           </a:p>
@@ -1967,7 +2081,7 @@
           <a:p>
             <a:fld id="{153CC46C-119B-4506-9A6D-47CA46A40AA4}" type="datetimeFigureOut">
               <a:rPr lang="en-GB" smtClean="0"/>
-              <a:t>14/06/2023</a:t>
+              <a:t>15/06/2023</a:t>
             </a:fld>
             <a:endParaRPr lang="en-GB"/>
           </a:p>
@@ -2080,7 +2194,7 @@
           <a:p>
             <a:fld id="{153CC46C-119B-4506-9A6D-47CA46A40AA4}" type="datetimeFigureOut">
               <a:rPr lang="en-GB" smtClean="0"/>
-              <a:t>14/06/2023</a:t>
+              <a:t>15/06/2023</a:t>
             </a:fld>
             <a:endParaRPr lang="en-GB"/>
           </a:p>
@@ -2393,7 +2507,7 @@
           <a:p>
             <a:fld id="{153CC46C-119B-4506-9A6D-47CA46A40AA4}" type="datetimeFigureOut">
               <a:rPr lang="en-GB" smtClean="0"/>
-              <a:t>14/06/2023</a:t>
+              <a:t>15/06/2023</a:t>
             </a:fld>
             <a:endParaRPr lang="en-GB"/>
           </a:p>
@@ -2682,7 +2796,7 @@
           <a:p>
             <a:fld id="{153CC46C-119B-4506-9A6D-47CA46A40AA4}" type="datetimeFigureOut">
               <a:rPr lang="en-GB" smtClean="0"/>
-              <a:t>14/06/2023</a:t>
+              <a:t>15/06/2023</a:t>
             </a:fld>
             <a:endParaRPr lang="en-GB"/>
           </a:p>
@@ -2925,7 +3039,7 @@
           <a:p>
             <a:fld id="{153CC46C-119B-4506-9A6D-47CA46A40AA4}" type="datetimeFigureOut">
               <a:rPr lang="en-GB" smtClean="0"/>
-              <a:t>14/06/2023</a:t>
+              <a:t>15/06/2023</a:t>
             </a:fld>
             <a:endParaRPr lang="en-GB"/>
           </a:p>
@@ -3344,10 +3458,10 @@
       </p:grpSpPr>
       <p:grpSp>
         <p:nvGrpSpPr>
-          <p:cNvPr id="59" name="Groep 58">
-            <a:extLst>
-              <a:ext uri="{FF2B5EF4-FFF2-40B4-BE49-F238E27FC236}">
-                <a16:creationId xmlns:a16="http://schemas.microsoft.com/office/drawing/2014/main" id="{C1046AAF-A559-CF06-85B1-AB9623869F80}"/>
+          <p:cNvPr id="13" name="Groep 12">
+            <a:extLst>
+              <a:ext uri="{FF2B5EF4-FFF2-40B4-BE49-F238E27FC236}">
+                <a16:creationId xmlns:a16="http://schemas.microsoft.com/office/drawing/2014/main" id="{B44313DD-451F-8F2E-BFC2-F41AD92B4D2D}"/>
               </a:ext>
             </a:extLst>
           </p:cNvPr>
@@ -3364,10 +3478,10 @@
         </p:grpSpPr>
         <p:sp>
           <p:nvSpPr>
-            <p:cNvPr id="4" name="Rechthoek 3">
+            <p:cNvPr id="2" name="Rechthoek 1">
               <a:extLst>
                 <a:ext uri="{FF2B5EF4-FFF2-40B4-BE49-F238E27FC236}">
-                  <a16:creationId xmlns:a16="http://schemas.microsoft.com/office/drawing/2014/main" id="{F7BFE642-A7FD-5CA8-EC1B-FFF7DBD56DFF}"/>
+                  <a16:creationId xmlns:a16="http://schemas.microsoft.com/office/drawing/2014/main" id="{0865C89D-F39A-85F9-06D0-0A4D3E97ABAB}"/>
                 </a:ext>
               </a:extLst>
             </p:cNvPr>
@@ -3376,7 +3490,7 @@
           </p:nvSpPr>
           <p:spPr>
             <a:xfrm>
-              <a:off x="1074656" y="4901938"/>
+              <a:off x="4916350" y="2826470"/>
               <a:ext cx="1489435" cy="188536"/>
             </a:xfrm>
             <a:prstGeom prst="rect">
@@ -3416,10 +3530,10 @@
         </p:sp>
         <p:sp>
           <p:nvSpPr>
-            <p:cNvPr id="5" name="Rechthoek 4">
+            <p:cNvPr id="3" name="Rechthoek 2">
               <a:extLst>
                 <a:ext uri="{FF2B5EF4-FFF2-40B4-BE49-F238E27FC236}">
-                  <a16:creationId xmlns:a16="http://schemas.microsoft.com/office/drawing/2014/main" id="{174595D9-1D08-B9FF-5A4F-8D6E642CB8AD}"/>
+                  <a16:creationId xmlns:a16="http://schemas.microsoft.com/office/drawing/2014/main" id="{9832670E-56BA-14AB-30F3-AEEE1C3A56AC}"/>
                 </a:ext>
               </a:extLst>
             </p:cNvPr>
@@ -3428,7 +3542,7 @@
           </p:nvSpPr>
           <p:spPr>
             <a:xfrm>
-              <a:off x="1074656" y="4688541"/>
+              <a:off x="4916351" y="2626890"/>
               <a:ext cx="1489435" cy="51893"/>
             </a:xfrm>
             <a:prstGeom prst="rect">
@@ -3468,10 +3582,10 @@
         </p:sp>
         <p:sp>
           <p:nvSpPr>
-            <p:cNvPr id="8" name="Rechthoek 7">
+            <p:cNvPr id="6" name="Rechthoek 5">
               <a:extLst>
                 <a:ext uri="{FF2B5EF4-FFF2-40B4-BE49-F238E27FC236}">
-                  <a16:creationId xmlns:a16="http://schemas.microsoft.com/office/drawing/2014/main" id="{7207E8A6-547C-E587-2E34-8AB201F6E77E}"/>
+                  <a16:creationId xmlns:a16="http://schemas.microsoft.com/office/drawing/2014/main" id="{EB2B5735-4008-69B7-5FC8-A884FD3C06CC}"/>
                 </a:ext>
               </a:extLst>
             </p:cNvPr>
@@ -3480,7 +3594,7 @@
           </p:nvSpPr>
           <p:spPr>
             <a:xfrm>
-              <a:off x="1074656" y="4475144"/>
+              <a:off x="4916351" y="2413493"/>
               <a:ext cx="1489435" cy="51893"/>
             </a:xfrm>
             <a:prstGeom prst="rect">
@@ -3520,10 +3634,10 @@
         </p:sp>
         <p:sp>
           <p:nvSpPr>
-            <p:cNvPr id="9" name="Rechthoek 8">
+            <p:cNvPr id="7" name="Rechthoek 6">
               <a:extLst>
                 <a:ext uri="{FF2B5EF4-FFF2-40B4-BE49-F238E27FC236}">
-                  <a16:creationId xmlns:a16="http://schemas.microsoft.com/office/drawing/2014/main" id="{1E732195-E83F-369A-24E1-72758A87E795}"/>
+                  <a16:creationId xmlns:a16="http://schemas.microsoft.com/office/drawing/2014/main" id="{FE3376B0-686B-7573-1659-831A510254C6}"/>
                 </a:ext>
               </a:extLst>
             </p:cNvPr>
@@ -3532,7 +3646,7 @@
           </p:nvSpPr>
           <p:spPr>
             <a:xfrm>
-              <a:off x="1074655" y="4361098"/>
+              <a:off x="4916350" y="2299447"/>
               <a:ext cx="1489435" cy="51893"/>
             </a:xfrm>
             <a:prstGeom prst="rect">
@@ -3570,1298 +3684,1433 @@
             </a:p>
           </p:txBody>
         </p:sp>
-        <p:cxnSp>
-          <p:nvCxnSpPr>
-            <p:cNvPr id="11" name="Rechte verbindingslijn met pijl 10">
+        <p:grpSp>
+          <p:nvGrpSpPr>
+            <p:cNvPr id="59" name="Groep 58">
               <a:extLst>
                 <a:ext uri="{FF2B5EF4-FFF2-40B4-BE49-F238E27FC236}">
-                  <a16:creationId xmlns:a16="http://schemas.microsoft.com/office/drawing/2014/main" id="{89803422-68D1-CE5A-E254-7F535D76A52E}"/>
+                  <a16:creationId xmlns:a16="http://schemas.microsoft.com/office/drawing/2014/main" id="{C1046AAF-A559-CF06-85B1-AB9623869F80}"/>
                 </a:ext>
               </a:extLst>
             </p:cNvPr>
-            <p:cNvCxnSpPr>
-              <a:cxnSpLocks/>
-            </p:cNvCxnSpPr>
+            <p:cNvGrpSpPr/>
             <p:nvPr/>
-          </p:nvCxnSpPr>
-          <p:spPr>
-            <a:xfrm flipV="1">
-              <a:off x="1506070" y="3736526"/>
-              <a:ext cx="0" cy="1165412"/>
+          </p:nvGrpSpPr>
+          <p:grpSpPr>
+            <a:xfrm>
+              <a:off x="138872" y="1246094"/>
+              <a:ext cx="6266915" cy="4308679"/>
+              <a:chOff x="138872" y="1246094"/>
+              <a:chExt cx="6266915" cy="4308679"/>
             </a:xfrm>
-            <a:prstGeom prst="straightConnector1">
-              <a:avLst/>
-            </a:prstGeom>
-            <a:ln w="57150">
-              <a:solidFill>
-                <a:schemeClr val="bg2">
-                  <a:lumMod val="50000"/>
-                </a:schemeClr>
-              </a:solidFill>
-              <a:tailEnd type="triangle"/>
-            </a:ln>
-          </p:spPr>
-          <p:style>
-            <a:lnRef idx="1">
-              <a:schemeClr val="accent1"/>
-            </a:lnRef>
-            <a:fillRef idx="0">
-              <a:schemeClr val="accent1"/>
-            </a:fillRef>
-            <a:effectRef idx="0">
-              <a:schemeClr val="accent1"/>
-            </a:effectRef>
-            <a:fontRef idx="minor">
-              <a:schemeClr val="tx1"/>
-            </a:fontRef>
-          </p:style>
-        </p:cxnSp>
-        <p:cxnSp>
-          <p:nvCxnSpPr>
-            <p:cNvPr id="16" name="Rechte verbindingslijn met pijl 15">
-              <a:extLst>
-                <a:ext uri="{FF2B5EF4-FFF2-40B4-BE49-F238E27FC236}">
-                  <a16:creationId xmlns:a16="http://schemas.microsoft.com/office/drawing/2014/main" id="{10DE7B1E-6560-12AE-FD3A-52DF2E3BB611}"/>
-                </a:ext>
-              </a:extLst>
-            </p:cNvPr>
-            <p:cNvCxnSpPr>
-              <a:cxnSpLocks/>
-            </p:cNvCxnSpPr>
-            <p:nvPr/>
-          </p:nvCxnSpPr>
-          <p:spPr>
-            <a:xfrm flipV="1">
-              <a:off x="1506069" y="2571114"/>
-              <a:ext cx="0" cy="1165412"/>
-            </a:xfrm>
-            <a:prstGeom prst="straightConnector1">
-              <a:avLst/>
-            </a:prstGeom>
-            <a:ln w="57150">
-              <a:solidFill>
-                <a:schemeClr val="bg2">
-                  <a:lumMod val="50000"/>
-                </a:schemeClr>
-              </a:solidFill>
-              <a:tailEnd type="triangle"/>
-            </a:ln>
-          </p:spPr>
-          <p:style>
-            <a:lnRef idx="1">
-              <a:schemeClr val="accent1"/>
-            </a:lnRef>
-            <a:fillRef idx="0">
-              <a:schemeClr val="accent1"/>
-            </a:fillRef>
-            <a:effectRef idx="0">
-              <a:schemeClr val="accent1"/>
-            </a:effectRef>
-            <a:fontRef idx="minor">
-              <a:schemeClr val="tx1"/>
-            </a:fontRef>
-          </p:style>
-        </p:cxnSp>
-        <p:cxnSp>
-          <p:nvCxnSpPr>
-            <p:cNvPr id="17" name="Rechte verbindingslijn met pijl 16">
-              <a:extLst>
-                <a:ext uri="{FF2B5EF4-FFF2-40B4-BE49-F238E27FC236}">
-                  <a16:creationId xmlns:a16="http://schemas.microsoft.com/office/drawing/2014/main" id="{4DFC21ED-DC79-5395-058D-BBEE61EE0A28}"/>
-                </a:ext>
-              </a:extLst>
-            </p:cNvPr>
-            <p:cNvCxnSpPr>
-              <a:cxnSpLocks/>
-            </p:cNvCxnSpPr>
-            <p:nvPr/>
-          </p:nvCxnSpPr>
-          <p:spPr>
-            <a:xfrm flipV="1">
-              <a:off x="1515032" y="1405702"/>
-              <a:ext cx="0" cy="1165412"/>
-            </a:xfrm>
-            <a:prstGeom prst="straightConnector1">
-              <a:avLst/>
-            </a:prstGeom>
-            <a:ln w="57150">
-              <a:solidFill>
-                <a:schemeClr val="bg2">
-                  <a:lumMod val="50000"/>
-                </a:schemeClr>
-              </a:solidFill>
-              <a:tailEnd type="triangle"/>
-            </a:ln>
-          </p:spPr>
-          <p:style>
-            <a:lnRef idx="1">
-              <a:schemeClr val="accent1"/>
-            </a:lnRef>
-            <a:fillRef idx="0">
-              <a:schemeClr val="accent1"/>
-            </a:fillRef>
-            <a:effectRef idx="0">
-              <a:schemeClr val="accent1"/>
-            </a:effectRef>
-            <a:fontRef idx="minor">
-              <a:schemeClr val="tx1"/>
-            </a:fontRef>
-          </p:style>
-        </p:cxnSp>
-        <p:cxnSp>
-          <p:nvCxnSpPr>
-            <p:cNvPr id="20" name="Rechte verbindingslijn met pijl 19">
-              <a:extLst>
-                <a:ext uri="{FF2B5EF4-FFF2-40B4-BE49-F238E27FC236}">
-                  <a16:creationId xmlns:a16="http://schemas.microsoft.com/office/drawing/2014/main" id="{2889345A-818B-59AA-208B-2FA8BDCF428F}"/>
-                </a:ext>
-              </a:extLst>
-            </p:cNvPr>
-            <p:cNvCxnSpPr>
-              <a:cxnSpLocks/>
-            </p:cNvCxnSpPr>
-            <p:nvPr/>
-          </p:nvCxnSpPr>
-          <p:spPr>
-            <a:xfrm>
-              <a:off x="2151526" y="1405702"/>
-              <a:ext cx="0" cy="3496236"/>
-            </a:xfrm>
-            <a:prstGeom prst="straightConnector1">
-              <a:avLst/>
-            </a:prstGeom>
-            <a:ln w="57150">
-              <a:solidFill>
-                <a:srgbClr val="00B050"/>
-              </a:solidFill>
-              <a:tailEnd type="triangle"/>
-            </a:ln>
-          </p:spPr>
-          <p:style>
-            <a:lnRef idx="1">
-              <a:schemeClr val="accent1"/>
-            </a:lnRef>
-            <a:fillRef idx="0">
-              <a:schemeClr val="accent1"/>
-            </a:fillRef>
-            <a:effectRef idx="0">
-              <a:schemeClr val="accent1"/>
-            </a:effectRef>
-            <a:fontRef idx="minor">
-              <a:schemeClr val="tx1"/>
-            </a:fontRef>
-          </p:style>
-        </p:cxnSp>
-        <p:cxnSp>
-          <p:nvCxnSpPr>
-            <p:cNvPr id="25" name="Rechte verbindingslijn 24">
-              <a:extLst>
-                <a:ext uri="{FF2B5EF4-FFF2-40B4-BE49-F238E27FC236}">
-                  <a16:creationId xmlns:a16="http://schemas.microsoft.com/office/drawing/2014/main" id="{8C9DF893-910E-CE30-256B-DA9293F238CF}"/>
-                </a:ext>
-              </a:extLst>
-            </p:cNvPr>
-            <p:cNvCxnSpPr>
-              <a:cxnSpLocks/>
-            </p:cNvCxnSpPr>
-            <p:nvPr/>
-          </p:nvCxnSpPr>
-          <p:spPr>
-            <a:xfrm>
-              <a:off x="1074655" y="1379091"/>
-              <a:ext cx="1489435" cy="0"/>
-            </a:xfrm>
-            <a:prstGeom prst="line">
-              <a:avLst/>
-            </a:prstGeom>
-            <a:ln w="57150">
-              <a:solidFill>
-                <a:schemeClr val="tx1">
-                  <a:lumMod val="95000"/>
-                  <a:lumOff val="5000"/>
-                </a:schemeClr>
-              </a:solidFill>
-              <a:prstDash val="dash"/>
-            </a:ln>
-          </p:spPr>
-          <p:style>
-            <a:lnRef idx="1">
-              <a:schemeClr val="accent1"/>
-            </a:lnRef>
-            <a:fillRef idx="0">
-              <a:schemeClr val="accent1"/>
-            </a:fillRef>
-            <a:effectRef idx="0">
-              <a:schemeClr val="accent1"/>
-            </a:effectRef>
-            <a:fontRef idx="minor">
-              <a:schemeClr val="tx1"/>
-            </a:fontRef>
-          </p:style>
-        </p:cxnSp>
-        <p:sp>
-          <p:nvSpPr>
-            <p:cNvPr id="28" name="Rechthoek 27">
-              <a:extLst>
-                <a:ext uri="{FF2B5EF4-FFF2-40B4-BE49-F238E27FC236}">
-                  <a16:creationId xmlns:a16="http://schemas.microsoft.com/office/drawing/2014/main" id="{D14ECD08-9E64-46BF-8E8D-139DB6A74414}"/>
-                </a:ext>
-              </a:extLst>
-            </p:cNvPr>
-            <p:cNvSpPr/>
-            <p:nvPr/>
-          </p:nvSpPr>
-          <p:spPr>
-            <a:xfrm>
-              <a:off x="2995505" y="4906189"/>
-              <a:ext cx="1489435" cy="188536"/>
-            </a:xfrm>
-            <a:prstGeom prst="rect">
-              <a:avLst/>
-            </a:prstGeom>
-            <a:solidFill>
-              <a:schemeClr val="tx1"/>
-            </a:solidFill>
-            <a:ln>
-              <a:noFill/>
-            </a:ln>
-          </p:spPr>
-          <p:style>
-            <a:lnRef idx="2">
-              <a:schemeClr val="accent1">
-                <a:shade val="50000"/>
-              </a:schemeClr>
-            </a:lnRef>
-            <a:fillRef idx="1">
-              <a:schemeClr val="accent1"/>
-            </a:fillRef>
-            <a:effectRef idx="0">
-              <a:schemeClr val="accent1"/>
-            </a:effectRef>
-            <a:fontRef idx="minor">
-              <a:schemeClr val="lt1"/>
-            </a:fontRef>
-          </p:style>
-          <p:txBody>
-            <a:bodyPr rtlCol="0" anchor="ctr"/>
-            <a:lstStyle/>
-            <a:p>
-              <a:pPr algn="ctr"/>
-              <a:endParaRPr lang="en-GB"/>
-            </a:p>
-          </p:txBody>
-        </p:sp>
-        <p:sp>
-          <p:nvSpPr>
-            <p:cNvPr id="29" name="Rechthoek 28">
-              <a:extLst>
-                <a:ext uri="{FF2B5EF4-FFF2-40B4-BE49-F238E27FC236}">
-                  <a16:creationId xmlns:a16="http://schemas.microsoft.com/office/drawing/2014/main" id="{FBC1E706-FCEC-5DE3-E358-8F0E6DE62B03}"/>
-                </a:ext>
-              </a:extLst>
-            </p:cNvPr>
-            <p:cNvSpPr/>
-            <p:nvPr/>
-          </p:nvSpPr>
-          <p:spPr>
-            <a:xfrm>
-              <a:off x="2995505" y="4692792"/>
-              <a:ext cx="1489435" cy="51893"/>
-            </a:xfrm>
-            <a:prstGeom prst="rect">
-              <a:avLst/>
-            </a:prstGeom>
-            <a:solidFill>
-              <a:schemeClr val="tx1"/>
-            </a:solidFill>
-            <a:ln>
-              <a:noFill/>
-            </a:ln>
-          </p:spPr>
-          <p:style>
-            <a:lnRef idx="2">
-              <a:schemeClr val="accent1">
-                <a:shade val="50000"/>
-              </a:schemeClr>
-            </a:lnRef>
-            <a:fillRef idx="1">
-              <a:schemeClr val="accent1"/>
-            </a:fillRef>
-            <a:effectRef idx="0">
-              <a:schemeClr val="accent1"/>
-            </a:effectRef>
-            <a:fontRef idx="minor">
-              <a:schemeClr val="lt1"/>
-            </a:fontRef>
-          </p:style>
-          <p:txBody>
-            <a:bodyPr rtlCol="0" anchor="ctr"/>
-            <a:lstStyle/>
-            <a:p>
-              <a:pPr algn="ctr"/>
-              <a:endParaRPr lang="en-GB"/>
-            </a:p>
-          </p:txBody>
-        </p:sp>
-        <p:sp>
-          <p:nvSpPr>
-            <p:cNvPr id="30" name="Rechthoek 29">
-              <a:extLst>
-                <a:ext uri="{FF2B5EF4-FFF2-40B4-BE49-F238E27FC236}">
-                  <a16:creationId xmlns:a16="http://schemas.microsoft.com/office/drawing/2014/main" id="{0B3F400D-514C-C0DD-15E1-104DFADD94D0}"/>
-                </a:ext>
-              </a:extLst>
-            </p:cNvPr>
-            <p:cNvSpPr/>
-            <p:nvPr/>
-          </p:nvSpPr>
-          <p:spPr>
-            <a:xfrm>
-              <a:off x="2995505" y="4479395"/>
-              <a:ext cx="1489435" cy="51893"/>
-            </a:xfrm>
-            <a:prstGeom prst="rect">
-              <a:avLst/>
-            </a:prstGeom>
-            <a:solidFill>
-              <a:schemeClr val="tx1"/>
-            </a:solidFill>
-            <a:ln>
-              <a:noFill/>
-            </a:ln>
-          </p:spPr>
-          <p:style>
-            <a:lnRef idx="2">
-              <a:schemeClr val="accent1">
-                <a:shade val="50000"/>
-              </a:schemeClr>
-            </a:lnRef>
-            <a:fillRef idx="1">
-              <a:schemeClr val="accent1"/>
-            </a:fillRef>
-            <a:effectRef idx="0">
-              <a:schemeClr val="accent1"/>
-            </a:effectRef>
-            <a:fontRef idx="minor">
-              <a:schemeClr val="lt1"/>
-            </a:fontRef>
-          </p:style>
-          <p:txBody>
-            <a:bodyPr rtlCol="0" anchor="ctr"/>
-            <a:lstStyle/>
-            <a:p>
-              <a:pPr algn="ctr"/>
-              <a:endParaRPr lang="en-GB"/>
-            </a:p>
-          </p:txBody>
-        </p:sp>
-        <p:sp>
-          <p:nvSpPr>
-            <p:cNvPr id="31" name="Rechthoek 30">
-              <a:extLst>
-                <a:ext uri="{FF2B5EF4-FFF2-40B4-BE49-F238E27FC236}">
-                  <a16:creationId xmlns:a16="http://schemas.microsoft.com/office/drawing/2014/main" id="{A5BDFF0C-F650-F726-8DAE-952B5913DACF}"/>
-                </a:ext>
-              </a:extLst>
-            </p:cNvPr>
-            <p:cNvSpPr/>
-            <p:nvPr/>
-          </p:nvSpPr>
-          <p:spPr>
-            <a:xfrm>
-              <a:off x="2995504" y="4365349"/>
-              <a:ext cx="1489435" cy="51893"/>
-            </a:xfrm>
-            <a:prstGeom prst="rect">
-              <a:avLst/>
-            </a:prstGeom>
-            <a:solidFill>
-              <a:schemeClr val="tx1"/>
-            </a:solidFill>
-            <a:ln>
-              <a:noFill/>
-            </a:ln>
-          </p:spPr>
-          <p:style>
-            <a:lnRef idx="2">
-              <a:schemeClr val="accent1">
-                <a:shade val="50000"/>
-              </a:schemeClr>
-            </a:lnRef>
-            <a:fillRef idx="1">
-              <a:schemeClr val="accent1"/>
-            </a:fillRef>
-            <a:effectRef idx="0">
-              <a:schemeClr val="accent1"/>
-            </a:effectRef>
-            <a:fontRef idx="minor">
-              <a:schemeClr val="lt1"/>
-            </a:fontRef>
-          </p:style>
-          <p:txBody>
-            <a:bodyPr rtlCol="0" anchor="ctr"/>
-            <a:lstStyle/>
-            <a:p>
-              <a:pPr algn="ctr"/>
-              <a:endParaRPr lang="en-GB"/>
-            </a:p>
-          </p:txBody>
-        </p:sp>
-        <p:cxnSp>
-          <p:nvCxnSpPr>
-            <p:cNvPr id="32" name="Rechte verbindingslijn met pijl 31">
-              <a:extLst>
-                <a:ext uri="{FF2B5EF4-FFF2-40B4-BE49-F238E27FC236}">
-                  <a16:creationId xmlns:a16="http://schemas.microsoft.com/office/drawing/2014/main" id="{64905B40-E16B-6DF0-A6B1-9974DC042BE8}"/>
-                </a:ext>
-              </a:extLst>
-            </p:cNvPr>
-            <p:cNvCxnSpPr>
-              <a:cxnSpLocks/>
-            </p:cNvCxnSpPr>
-            <p:nvPr/>
-          </p:nvCxnSpPr>
-          <p:spPr>
-            <a:xfrm flipV="1">
-              <a:off x="3426919" y="3740777"/>
-              <a:ext cx="0" cy="1165412"/>
-            </a:xfrm>
-            <a:prstGeom prst="straightConnector1">
-              <a:avLst/>
-            </a:prstGeom>
-            <a:ln w="57150">
-              <a:solidFill>
-                <a:schemeClr val="bg2">
-                  <a:lumMod val="50000"/>
-                </a:schemeClr>
-              </a:solidFill>
-              <a:tailEnd type="triangle"/>
-            </a:ln>
-          </p:spPr>
-          <p:style>
-            <a:lnRef idx="1">
-              <a:schemeClr val="accent1"/>
-            </a:lnRef>
-            <a:fillRef idx="0">
-              <a:schemeClr val="accent1"/>
-            </a:fillRef>
-            <a:effectRef idx="0">
-              <a:schemeClr val="accent1"/>
-            </a:effectRef>
-            <a:fontRef idx="minor">
-              <a:schemeClr val="tx1"/>
-            </a:fontRef>
-          </p:style>
-        </p:cxnSp>
-        <p:cxnSp>
-          <p:nvCxnSpPr>
-            <p:cNvPr id="33" name="Rechte verbindingslijn met pijl 32">
-              <a:extLst>
-                <a:ext uri="{FF2B5EF4-FFF2-40B4-BE49-F238E27FC236}">
-                  <a16:creationId xmlns:a16="http://schemas.microsoft.com/office/drawing/2014/main" id="{96ECD3A9-13D6-3179-155F-258D7EB65185}"/>
-                </a:ext>
-              </a:extLst>
-            </p:cNvPr>
-            <p:cNvCxnSpPr>
-              <a:cxnSpLocks/>
-            </p:cNvCxnSpPr>
-            <p:nvPr/>
-          </p:nvCxnSpPr>
-          <p:spPr>
-            <a:xfrm flipV="1">
-              <a:off x="3426918" y="2575365"/>
-              <a:ext cx="0" cy="1165412"/>
-            </a:xfrm>
-            <a:prstGeom prst="straightConnector1">
-              <a:avLst/>
-            </a:prstGeom>
-            <a:ln w="57150">
-              <a:solidFill>
-                <a:schemeClr val="bg2">
-                  <a:lumMod val="50000"/>
-                </a:schemeClr>
-              </a:solidFill>
-              <a:tailEnd type="triangle"/>
-            </a:ln>
-          </p:spPr>
-          <p:style>
-            <a:lnRef idx="1">
-              <a:schemeClr val="accent1"/>
-            </a:lnRef>
-            <a:fillRef idx="0">
-              <a:schemeClr val="accent1"/>
-            </a:fillRef>
-            <a:effectRef idx="0">
-              <a:schemeClr val="accent1"/>
-            </a:effectRef>
-            <a:fontRef idx="minor">
-              <a:schemeClr val="tx1"/>
-            </a:fontRef>
-          </p:style>
-        </p:cxnSp>
-        <p:cxnSp>
-          <p:nvCxnSpPr>
-            <p:cNvPr id="35" name="Rechte verbindingslijn met pijl 34">
-              <a:extLst>
-                <a:ext uri="{FF2B5EF4-FFF2-40B4-BE49-F238E27FC236}">
-                  <a16:creationId xmlns:a16="http://schemas.microsoft.com/office/drawing/2014/main" id="{732CC58A-9E8F-8B17-5EA7-CF72714B41ED}"/>
-                </a:ext>
-              </a:extLst>
-            </p:cNvPr>
-            <p:cNvCxnSpPr>
-              <a:cxnSpLocks/>
-            </p:cNvCxnSpPr>
-            <p:nvPr/>
-          </p:nvCxnSpPr>
-          <p:spPr>
-            <a:xfrm>
-              <a:off x="4072375" y="2571114"/>
-              <a:ext cx="0" cy="2335075"/>
-            </a:xfrm>
-            <a:prstGeom prst="straightConnector1">
-              <a:avLst/>
-            </a:prstGeom>
-            <a:ln w="57150">
-              <a:solidFill>
-                <a:srgbClr val="FF0000"/>
-              </a:solidFill>
-              <a:tailEnd type="triangle"/>
-            </a:ln>
-          </p:spPr>
-          <p:style>
-            <a:lnRef idx="1">
-              <a:schemeClr val="accent1"/>
-            </a:lnRef>
-            <a:fillRef idx="0">
-              <a:schemeClr val="accent1"/>
-            </a:fillRef>
-            <a:effectRef idx="0">
-              <a:schemeClr val="accent1"/>
-            </a:effectRef>
-            <a:fontRef idx="minor">
-              <a:schemeClr val="tx1"/>
-            </a:fontRef>
-          </p:style>
-        </p:cxnSp>
-        <p:cxnSp>
-          <p:nvCxnSpPr>
-            <p:cNvPr id="36" name="Rechte verbindingslijn 35">
-              <a:extLst>
-                <a:ext uri="{FF2B5EF4-FFF2-40B4-BE49-F238E27FC236}">
-                  <a16:creationId xmlns:a16="http://schemas.microsoft.com/office/drawing/2014/main" id="{6DBEFDBF-56F7-7D39-98AF-EAFFE81BF169}"/>
-                </a:ext>
-              </a:extLst>
-            </p:cNvPr>
-            <p:cNvCxnSpPr>
-              <a:cxnSpLocks/>
-            </p:cNvCxnSpPr>
-            <p:nvPr/>
-          </p:nvCxnSpPr>
-          <p:spPr>
-            <a:xfrm>
-              <a:off x="2995504" y="2544219"/>
-              <a:ext cx="1489435" cy="0"/>
-            </a:xfrm>
-            <a:prstGeom prst="line">
-              <a:avLst/>
-            </a:prstGeom>
-            <a:ln w="57150">
-              <a:solidFill>
-                <a:schemeClr val="tx1">
-                  <a:lumMod val="95000"/>
-                  <a:lumOff val="5000"/>
-                </a:schemeClr>
-              </a:solidFill>
-              <a:prstDash val="dash"/>
-            </a:ln>
-          </p:spPr>
-          <p:style>
-            <a:lnRef idx="1">
-              <a:schemeClr val="accent1"/>
-            </a:lnRef>
-            <a:fillRef idx="0">
-              <a:schemeClr val="accent1"/>
-            </a:fillRef>
-            <a:effectRef idx="0">
-              <a:schemeClr val="accent1"/>
-            </a:effectRef>
-            <a:fontRef idx="minor">
-              <a:schemeClr val="tx1"/>
-            </a:fontRef>
-          </p:style>
-        </p:cxnSp>
-        <p:sp>
-          <p:nvSpPr>
-            <p:cNvPr id="39" name="Rechthoek 38">
-              <a:extLst>
-                <a:ext uri="{FF2B5EF4-FFF2-40B4-BE49-F238E27FC236}">
-                  <a16:creationId xmlns:a16="http://schemas.microsoft.com/office/drawing/2014/main" id="{1ACF17E0-3161-EDB5-2111-96197241CA49}"/>
-                </a:ext>
-              </a:extLst>
-            </p:cNvPr>
-            <p:cNvSpPr/>
-            <p:nvPr/>
-          </p:nvSpPr>
-          <p:spPr>
-            <a:xfrm>
-              <a:off x="4916352" y="4901938"/>
-              <a:ext cx="1489435" cy="188536"/>
-            </a:xfrm>
-            <a:prstGeom prst="rect">
-              <a:avLst/>
-            </a:prstGeom>
-            <a:solidFill>
-              <a:schemeClr val="tx1"/>
-            </a:solidFill>
-            <a:ln>
-              <a:noFill/>
-            </a:ln>
-          </p:spPr>
-          <p:style>
-            <a:lnRef idx="2">
-              <a:schemeClr val="accent1">
-                <a:shade val="50000"/>
-              </a:schemeClr>
-            </a:lnRef>
-            <a:fillRef idx="1">
-              <a:schemeClr val="accent1"/>
-            </a:fillRef>
-            <a:effectRef idx="0">
-              <a:schemeClr val="accent1"/>
-            </a:effectRef>
-            <a:fontRef idx="minor">
-              <a:schemeClr val="lt1"/>
-            </a:fontRef>
-          </p:style>
-          <p:txBody>
-            <a:bodyPr rtlCol="0" anchor="ctr"/>
-            <a:lstStyle/>
-            <a:p>
-              <a:pPr algn="ctr"/>
-              <a:endParaRPr lang="en-GB"/>
-            </a:p>
-          </p:txBody>
-        </p:sp>
-        <p:sp>
-          <p:nvSpPr>
-            <p:cNvPr id="40" name="Rechthoek 39">
-              <a:extLst>
-                <a:ext uri="{FF2B5EF4-FFF2-40B4-BE49-F238E27FC236}">
-                  <a16:creationId xmlns:a16="http://schemas.microsoft.com/office/drawing/2014/main" id="{BD5C2EEC-7D9D-36B2-2034-67E0F73EE262}"/>
-                </a:ext>
-              </a:extLst>
-            </p:cNvPr>
-            <p:cNvSpPr/>
-            <p:nvPr/>
-          </p:nvSpPr>
-          <p:spPr>
-            <a:xfrm>
-              <a:off x="4916352" y="4688541"/>
-              <a:ext cx="1489435" cy="51893"/>
-            </a:xfrm>
-            <a:prstGeom prst="rect">
-              <a:avLst/>
-            </a:prstGeom>
-            <a:solidFill>
-              <a:schemeClr val="tx1"/>
-            </a:solidFill>
-            <a:ln>
-              <a:noFill/>
-            </a:ln>
-          </p:spPr>
-          <p:style>
-            <a:lnRef idx="2">
-              <a:schemeClr val="accent1">
-                <a:shade val="50000"/>
-              </a:schemeClr>
-            </a:lnRef>
-            <a:fillRef idx="1">
-              <a:schemeClr val="accent1"/>
-            </a:fillRef>
-            <a:effectRef idx="0">
-              <a:schemeClr val="accent1"/>
-            </a:effectRef>
-            <a:fontRef idx="minor">
-              <a:schemeClr val="lt1"/>
-            </a:fontRef>
-          </p:style>
-          <p:txBody>
-            <a:bodyPr rtlCol="0" anchor="ctr"/>
-            <a:lstStyle/>
-            <a:p>
-              <a:pPr algn="ctr"/>
-              <a:endParaRPr lang="en-GB"/>
-            </a:p>
-          </p:txBody>
-        </p:sp>
-        <p:sp>
-          <p:nvSpPr>
-            <p:cNvPr id="41" name="Rechthoek 40">
-              <a:extLst>
-                <a:ext uri="{FF2B5EF4-FFF2-40B4-BE49-F238E27FC236}">
-                  <a16:creationId xmlns:a16="http://schemas.microsoft.com/office/drawing/2014/main" id="{12AFCEDC-41C3-B583-C415-5C253D473896}"/>
-                </a:ext>
-              </a:extLst>
-            </p:cNvPr>
-            <p:cNvSpPr/>
-            <p:nvPr/>
-          </p:nvSpPr>
-          <p:spPr>
-            <a:xfrm>
-              <a:off x="4916352" y="4475144"/>
-              <a:ext cx="1489435" cy="51893"/>
-            </a:xfrm>
-            <a:prstGeom prst="rect">
-              <a:avLst/>
-            </a:prstGeom>
-            <a:solidFill>
-              <a:schemeClr val="tx1"/>
-            </a:solidFill>
-            <a:ln>
-              <a:noFill/>
-            </a:ln>
-          </p:spPr>
-          <p:style>
-            <a:lnRef idx="2">
-              <a:schemeClr val="accent1">
-                <a:shade val="50000"/>
-              </a:schemeClr>
-            </a:lnRef>
-            <a:fillRef idx="1">
-              <a:schemeClr val="accent1"/>
-            </a:fillRef>
-            <a:effectRef idx="0">
-              <a:schemeClr val="accent1"/>
-            </a:effectRef>
-            <a:fontRef idx="minor">
-              <a:schemeClr val="lt1"/>
-            </a:fontRef>
-          </p:style>
-          <p:txBody>
-            <a:bodyPr rtlCol="0" anchor="ctr"/>
-            <a:lstStyle/>
-            <a:p>
-              <a:pPr algn="ctr"/>
-              <a:endParaRPr lang="en-GB"/>
-            </a:p>
-          </p:txBody>
-        </p:sp>
-        <p:sp>
-          <p:nvSpPr>
-            <p:cNvPr id="42" name="Rechthoek 41">
-              <a:extLst>
-                <a:ext uri="{FF2B5EF4-FFF2-40B4-BE49-F238E27FC236}">
-                  <a16:creationId xmlns:a16="http://schemas.microsoft.com/office/drawing/2014/main" id="{4A63B4DA-C375-1668-3364-ACC34598FF41}"/>
-                </a:ext>
-              </a:extLst>
-            </p:cNvPr>
-            <p:cNvSpPr/>
-            <p:nvPr/>
-          </p:nvSpPr>
-          <p:spPr>
-            <a:xfrm>
-              <a:off x="4916351" y="4361098"/>
-              <a:ext cx="1489435" cy="51893"/>
-            </a:xfrm>
-            <a:prstGeom prst="rect">
-              <a:avLst/>
-            </a:prstGeom>
-            <a:solidFill>
-              <a:schemeClr val="tx1"/>
-            </a:solidFill>
-            <a:ln>
-              <a:noFill/>
-            </a:ln>
-          </p:spPr>
-          <p:style>
-            <a:lnRef idx="2">
-              <a:schemeClr val="accent1">
-                <a:shade val="50000"/>
-              </a:schemeClr>
-            </a:lnRef>
-            <a:fillRef idx="1">
-              <a:schemeClr val="accent1"/>
-            </a:fillRef>
-            <a:effectRef idx="0">
-              <a:schemeClr val="accent1"/>
-            </a:effectRef>
-            <a:fontRef idx="minor">
-              <a:schemeClr val="lt1"/>
-            </a:fontRef>
-          </p:style>
-          <p:txBody>
-            <a:bodyPr rtlCol="0" anchor="ctr"/>
-            <a:lstStyle/>
-            <a:p>
-              <a:pPr algn="ctr"/>
-              <a:endParaRPr lang="en-GB"/>
-            </a:p>
-          </p:txBody>
-        </p:sp>
-        <p:cxnSp>
-          <p:nvCxnSpPr>
-            <p:cNvPr id="43" name="Rechte verbindingslijn met pijl 42">
-              <a:extLst>
-                <a:ext uri="{FF2B5EF4-FFF2-40B4-BE49-F238E27FC236}">
-                  <a16:creationId xmlns:a16="http://schemas.microsoft.com/office/drawing/2014/main" id="{96B256EE-3146-8DE0-D8DE-42486DB39EC1}"/>
-                </a:ext>
-              </a:extLst>
-            </p:cNvPr>
-            <p:cNvCxnSpPr>
-              <a:cxnSpLocks/>
-            </p:cNvCxnSpPr>
-            <p:nvPr/>
-          </p:nvCxnSpPr>
-          <p:spPr>
-            <a:xfrm flipV="1">
-              <a:off x="5347766" y="3736526"/>
-              <a:ext cx="0" cy="1165412"/>
-            </a:xfrm>
-            <a:prstGeom prst="straightConnector1">
-              <a:avLst/>
-            </a:prstGeom>
-            <a:ln w="57150">
-              <a:solidFill>
-                <a:schemeClr val="bg2">
-                  <a:lumMod val="50000"/>
-                </a:schemeClr>
-              </a:solidFill>
-              <a:tailEnd type="triangle"/>
-            </a:ln>
-          </p:spPr>
-          <p:style>
-            <a:lnRef idx="1">
-              <a:schemeClr val="accent1"/>
-            </a:lnRef>
-            <a:fillRef idx="0">
-              <a:schemeClr val="accent1"/>
-            </a:fillRef>
-            <a:effectRef idx="0">
-              <a:schemeClr val="accent1"/>
-            </a:effectRef>
-            <a:fontRef idx="minor">
-              <a:schemeClr val="tx1"/>
-            </a:fontRef>
-          </p:style>
-        </p:cxnSp>
-        <p:cxnSp>
-          <p:nvCxnSpPr>
-            <p:cNvPr id="44" name="Rechte verbindingslijn met pijl 43">
-              <a:extLst>
-                <a:ext uri="{FF2B5EF4-FFF2-40B4-BE49-F238E27FC236}">
-                  <a16:creationId xmlns:a16="http://schemas.microsoft.com/office/drawing/2014/main" id="{150B94DC-077F-96A0-A08C-6D20ACA383B3}"/>
-                </a:ext>
-              </a:extLst>
-            </p:cNvPr>
-            <p:cNvCxnSpPr>
-              <a:cxnSpLocks/>
-            </p:cNvCxnSpPr>
-            <p:nvPr/>
-          </p:nvCxnSpPr>
-          <p:spPr>
-            <a:xfrm flipV="1">
-              <a:off x="5347765" y="2571114"/>
-              <a:ext cx="0" cy="1165412"/>
-            </a:xfrm>
-            <a:prstGeom prst="straightConnector1">
-              <a:avLst/>
-            </a:prstGeom>
-            <a:ln w="57150">
-              <a:solidFill>
-                <a:schemeClr val="bg2">
-                  <a:lumMod val="50000"/>
-                </a:schemeClr>
-              </a:solidFill>
-              <a:tailEnd type="triangle"/>
-            </a:ln>
-          </p:spPr>
-          <p:style>
-            <a:lnRef idx="1">
-              <a:schemeClr val="accent1"/>
-            </a:lnRef>
-            <a:fillRef idx="0">
-              <a:schemeClr val="accent1"/>
-            </a:fillRef>
-            <a:effectRef idx="0">
-              <a:schemeClr val="accent1"/>
-            </a:effectRef>
-            <a:fontRef idx="minor">
-              <a:schemeClr val="tx1"/>
-            </a:fontRef>
-          </p:style>
-        </p:cxnSp>
-        <p:cxnSp>
-          <p:nvCxnSpPr>
-            <p:cNvPr id="45" name="Rechte verbindingslijn met pijl 44">
-              <a:extLst>
-                <a:ext uri="{FF2B5EF4-FFF2-40B4-BE49-F238E27FC236}">
-                  <a16:creationId xmlns:a16="http://schemas.microsoft.com/office/drawing/2014/main" id="{EB3BB69C-07A0-BDBC-50E3-DE0E9A8FABA7}"/>
-                </a:ext>
-              </a:extLst>
-            </p:cNvPr>
-            <p:cNvCxnSpPr>
-              <a:cxnSpLocks/>
-            </p:cNvCxnSpPr>
-            <p:nvPr/>
-          </p:nvCxnSpPr>
-          <p:spPr>
-            <a:xfrm>
-              <a:off x="5993222" y="2880627"/>
-              <a:ext cx="0" cy="2021311"/>
-            </a:xfrm>
-            <a:prstGeom prst="straightConnector1">
-              <a:avLst/>
-            </a:prstGeom>
-            <a:ln w="57150">
-              <a:solidFill>
-                <a:srgbClr val="0070C0"/>
-              </a:solidFill>
-              <a:tailEnd type="triangle"/>
-            </a:ln>
-          </p:spPr>
-          <p:style>
-            <a:lnRef idx="1">
-              <a:schemeClr val="accent1"/>
-            </a:lnRef>
-            <a:fillRef idx="0">
-              <a:schemeClr val="accent1"/>
-            </a:fillRef>
-            <a:effectRef idx="0">
-              <a:schemeClr val="accent1"/>
-            </a:effectRef>
-            <a:fontRef idx="minor">
-              <a:schemeClr val="tx1"/>
-            </a:fontRef>
-          </p:style>
-        </p:cxnSp>
-        <p:cxnSp>
-          <p:nvCxnSpPr>
-            <p:cNvPr id="46" name="Rechte verbindingslijn 45">
-              <a:extLst>
-                <a:ext uri="{FF2B5EF4-FFF2-40B4-BE49-F238E27FC236}">
-                  <a16:creationId xmlns:a16="http://schemas.microsoft.com/office/drawing/2014/main" id="{A1C16807-AC7C-653D-2B29-19D36C2BF8A0}"/>
-                </a:ext>
-              </a:extLst>
-            </p:cNvPr>
-            <p:cNvCxnSpPr>
-              <a:cxnSpLocks/>
-            </p:cNvCxnSpPr>
-            <p:nvPr/>
-          </p:nvCxnSpPr>
-          <p:spPr>
-            <a:xfrm>
-              <a:off x="4916351" y="2539968"/>
-              <a:ext cx="1489435" cy="0"/>
-            </a:xfrm>
-            <a:prstGeom prst="line">
-              <a:avLst/>
-            </a:prstGeom>
-            <a:ln w="57150">
-              <a:solidFill>
-                <a:schemeClr val="tx1">
-                  <a:lumMod val="95000"/>
-                  <a:lumOff val="5000"/>
-                </a:schemeClr>
-              </a:solidFill>
-              <a:prstDash val="dash"/>
-            </a:ln>
-          </p:spPr>
-          <p:style>
-            <a:lnRef idx="1">
-              <a:schemeClr val="accent1"/>
-            </a:lnRef>
-            <a:fillRef idx="0">
-              <a:schemeClr val="accent1"/>
-            </a:fillRef>
-            <a:effectRef idx="0">
-              <a:schemeClr val="accent1"/>
-            </a:effectRef>
-            <a:fontRef idx="minor">
-              <a:schemeClr val="tx1"/>
-            </a:fontRef>
-          </p:style>
-        </p:cxnSp>
-        <p:cxnSp>
-          <p:nvCxnSpPr>
-            <p:cNvPr id="47" name="Rechte verbindingslijn 46">
-              <a:extLst>
-                <a:ext uri="{FF2B5EF4-FFF2-40B4-BE49-F238E27FC236}">
-                  <a16:creationId xmlns:a16="http://schemas.microsoft.com/office/drawing/2014/main" id="{329C7C3D-0960-EB88-F4AD-D61E10E25910}"/>
-                </a:ext>
-              </a:extLst>
-            </p:cNvPr>
-            <p:cNvCxnSpPr>
-              <a:cxnSpLocks/>
-            </p:cNvCxnSpPr>
-            <p:nvPr/>
-          </p:nvCxnSpPr>
-          <p:spPr>
-            <a:xfrm>
-              <a:off x="4916351" y="2880627"/>
-              <a:ext cx="1489435" cy="0"/>
-            </a:xfrm>
-            <a:prstGeom prst="line">
-              <a:avLst/>
-            </a:prstGeom>
-            <a:ln w="57150">
-              <a:solidFill>
-                <a:schemeClr val="tx1">
-                  <a:lumMod val="95000"/>
-                  <a:lumOff val="5000"/>
-                </a:schemeClr>
-              </a:solidFill>
-              <a:prstDash val="dash"/>
-            </a:ln>
-          </p:spPr>
-          <p:style>
-            <a:lnRef idx="1">
-              <a:schemeClr val="accent1"/>
-            </a:lnRef>
-            <a:fillRef idx="0">
-              <a:schemeClr val="accent1"/>
-            </a:fillRef>
-            <a:effectRef idx="0">
-              <a:schemeClr val="accent1"/>
-            </a:effectRef>
-            <a:fontRef idx="minor">
-              <a:schemeClr val="tx1"/>
-            </a:fontRef>
-          </p:style>
-        </p:cxnSp>
-        <p:cxnSp>
-          <p:nvCxnSpPr>
-            <p:cNvPr id="49" name="Rechte verbindingslijn met pijl 48">
-              <a:extLst>
-                <a:ext uri="{FF2B5EF4-FFF2-40B4-BE49-F238E27FC236}">
-                  <a16:creationId xmlns:a16="http://schemas.microsoft.com/office/drawing/2014/main" id="{C679ABFB-0C69-98C4-232E-ADC69710A336}"/>
-                </a:ext>
-              </a:extLst>
-            </p:cNvPr>
-            <p:cNvCxnSpPr>
-              <a:cxnSpLocks/>
-            </p:cNvCxnSpPr>
-            <p:nvPr/>
-          </p:nvCxnSpPr>
-          <p:spPr>
-            <a:xfrm>
-              <a:off x="5459506" y="2605077"/>
-              <a:ext cx="533716" cy="191911"/>
-            </a:xfrm>
-            <a:prstGeom prst="straightConnector1">
-              <a:avLst/>
-            </a:prstGeom>
-            <a:ln w="57150">
-              <a:solidFill>
-                <a:srgbClr val="0070C0"/>
-              </a:solidFill>
-              <a:prstDash val="sysDot"/>
-              <a:tailEnd type="triangle"/>
-            </a:ln>
-          </p:spPr>
-          <p:style>
-            <a:lnRef idx="1">
-              <a:schemeClr val="accent1"/>
-            </a:lnRef>
-            <a:fillRef idx="0">
-              <a:schemeClr val="accent1"/>
-            </a:fillRef>
-            <a:effectRef idx="0">
-              <a:schemeClr val="accent1"/>
-            </a:effectRef>
-            <a:fontRef idx="minor">
-              <a:schemeClr val="tx1"/>
-            </a:fontRef>
-          </p:style>
-        </p:cxnSp>
-        <p:sp>
-          <p:nvSpPr>
-            <p:cNvPr id="52" name="Tekstvak 51">
-              <a:extLst>
-                <a:ext uri="{FF2B5EF4-FFF2-40B4-BE49-F238E27FC236}">
-                  <a16:creationId xmlns:a16="http://schemas.microsoft.com/office/drawing/2014/main" id="{EE39DF1A-646F-3D3C-E04E-573F2ED293A4}"/>
-                </a:ext>
-              </a:extLst>
-            </p:cNvPr>
-            <p:cNvSpPr txBox="1"/>
-            <p:nvPr/>
-          </p:nvSpPr>
-          <p:spPr>
-            <a:xfrm>
-              <a:off x="1438743" y="5093108"/>
-              <a:ext cx="721672" cy="461665"/>
-            </a:xfrm>
-            <a:prstGeom prst="rect">
-              <a:avLst/>
-            </a:prstGeom>
-            <a:noFill/>
-          </p:spPr>
-          <p:txBody>
-            <a:bodyPr wrap="none" rtlCol="0">
-              <a:spAutoFit/>
-            </a:bodyPr>
-            <a:lstStyle/>
-            <a:p>
-              <a:pPr algn="ctr"/>
-              <a:r>
-                <a:rPr lang="en-GB" sz="2400" dirty="0"/>
-                <a:t>THG</a:t>
-              </a:r>
-            </a:p>
-          </p:txBody>
-        </p:sp>
-        <p:sp>
-          <p:nvSpPr>
-            <p:cNvPr id="53" name="Tekstvak 52">
-              <a:extLst>
-                <a:ext uri="{FF2B5EF4-FFF2-40B4-BE49-F238E27FC236}">
-                  <a16:creationId xmlns:a16="http://schemas.microsoft.com/office/drawing/2014/main" id="{94FA0A05-68E3-AB9B-5971-B6CDD2DC7BE4}"/>
-                </a:ext>
-              </a:extLst>
-            </p:cNvPr>
-            <p:cNvSpPr txBox="1"/>
-            <p:nvPr/>
-          </p:nvSpPr>
-          <p:spPr>
-            <a:xfrm>
-              <a:off x="3400784" y="5093108"/>
-              <a:ext cx="712054" cy="461665"/>
-            </a:xfrm>
-            <a:prstGeom prst="rect">
-              <a:avLst/>
-            </a:prstGeom>
-            <a:noFill/>
-          </p:spPr>
-          <p:txBody>
-            <a:bodyPr wrap="none" rtlCol="0">
-              <a:spAutoFit/>
-            </a:bodyPr>
-            <a:lstStyle/>
-            <a:p>
-              <a:pPr algn="ctr"/>
-              <a:r>
-                <a:rPr lang="en-GB" sz="2400" dirty="0"/>
-                <a:t>SHG</a:t>
-              </a:r>
-            </a:p>
-          </p:txBody>
-        </p:sp>
-        <p:sp>
-          <p:nvSpPr>
-            <p:cNvPr id="54" name="Tekstvak 53">
-              <a:extLst>
-                <a:ext uri="{FF2B5EF4-FFF2-40B4-BE49-F238E27FC236}">
-                  <a16:creationId xmlns:a16="http://schemas.microsoft.com/office/drawing/2014/main" id="{33CBE124-3E17-6FB8-E5BE-70FAE679E096}"/>
-                </a:ext>
-              </a:extLst>
-            </p:cNvPr>
-            <p:cNvSpPr txBox="1"/>
-            <p:nvPr/>
-          </p:nvSpPr>
-          <p:spPr>
-            <a:xfrm>
-              <a:off x="5271622" y="5090474"/>
-              <a:ext cx="790602" cy="461665"/>
-            </a:xfrm>
-            <a:prstGeom prst="rect">
-              <a:avLst/>
-            </a:prstGeom>
-            <a:noFill/>
-          </p:spPr>
-          <p:txBody>
-            <a:bodyPr wrap="none" rtlCol="0">
-              <a:spAutoFit/>
-            </a:bodyPr>
-            <a:lstStyle/>
-            <a:p>
-              <a:pPr algn="ctr"/>
-              <a:r>
-                <a:rPr lang="en-GB" sz="2400" dirty="0"/>
-                <a:t>2PEF</a:t>
-              </a:r>
-              <a:endParaRPr lang="en-GB" dirty="0"/>
-            </a:p>
-          </p:txBody>
-        </p:sp>
-        <p:cxnSp>
-          <p:nvCxnSpPr>
-            <p:cNvPr id="56" name="Rechte verbindingslijn met pijl 55">
-              <a:extLst>
-                <a:ext uri="{FF2B5EF4-FFF2-40B4-BE49-F238E27FC236}">
-                  <a16:creationId xmlns:a16="http://schemas.microsoft.com/office/drawing/2014/main" id="{FF7FE3C6-5E38-F10D-9008-4C3B92EAD230}"/>
-                </a:ext>
-              </a:extLst>
-            </p:cNvPr>
-            <p:cNvCxnSpPr>
-              <a:cxnSpLocks/>
-            </p:cNvCxnSpPr>
-            <p:nvPr/>
-          </p:nvCxnSpPr>
-          <p:spPr>
-            <a:xfrm flipV="1">
-              <a:off x="753035" y="1246094"/>
-              <a:ext cx="0" cy="3844380"/>
-            </a:xfrm>
-            <a:prstGeom prst="straightConnector1">
-              <a:avLst/>
-            </a:prstGeom>
-            <a:ln w="57150">
+          </p:grpSpPr>
+          <p:sp>
+            <p:nvSpPr>
+              <p:cNvPr id="4" name="Rechthoek 3">
+                <a:extLst>
+                  <a:ext uri="{FF2B5EF4-FFF2-40B4-BE49-F238E27FC236}">
+                    <a16:creationId xmlns:a16="http://schemas.microsoft.com/office/drawing/2014/main" id="{F7BFE642-A7FD-5CA8-EC1B-FFF7DBD56DFF}"/>
+                  </a:ext>
+                </a:extLst>
+              </p:cNvPr>
+              <p:cNvSpPr/>
+              <p:nvPr/>
+            </p:nvSpPr>
+            <p:spPr>
+              <a:xfrm>
+                <a:off x="1074656" y="4901938"/>
+                <a:ext cx="1489435" cy="188536"/>
+              </a:xfrm>
+              <a:prstGeom prst="rect">
+                <a:avLst/>
+              </a:prstGeom>
               <a:solidFill>
                 <a:schemeClr val="tx1"/>
               </a:solidFill>
-              <a:tailEnd type="triangle"/>
-            </a:ln>
-          </p:spPr>
-          <p:style>
-            <a:lnRef idx="1">
-              <a:schemeClr val="accent1"/>
-            </a:lnRef>
-            <a:fillRef idx="0">
-              <a:schemeClr val="accent1"/>
-            </a:fillRef>
-            <a:effectRef idx="0">
-              <a:schemeClr val="accent1"/>
-            </a:effectRef>
-            <a:fontRef idx="minor">
-              <a:schemeClr val="tx1"/>
-            </a:fontRef>
-          </p:style>
-        </p:cxnSp>
-        <p:sp>
-          <p:nvSpPr>
-            <p:cNvPr id="58" name="Tekstvak 57">
-              <a:extLst>
-                <a:ext uri="{FF2B5EF4-FFF2-40B4-BE49-F238E27FC236}">
-                  <a16:creationId xmlns:a16="http://schemas.microsoft.com/office/drawing/2014/main" id="{4D2CEB3E-D1E6-153F-A615-1527AFBA22D2}"/>
-                </a:ext>
-              </a:extLst>
-            </p:cNvPr>
-            <p:cNvSpPr txBox="1"/>
-            <p:nvPr/>
-          </p:nvSpPr>
-          <p:spPr>
-            <a:xfrm rot="16200000">
-              <a:off x="-187917" y="3021813"/>
-              <a:ext cx="1176797" cy="523220"/>
-            </a:xfrm>
-            <a:prstGeom prst="rect">
-              <a:avLst/>
-            </a:prstGeom>
-            <a:noFill/>
-          </p:spPr>
-          <p:txBody>
-            <a:bodyPr wrap="none" rtlCol="0">
-              <a:spAutoFit/>
-            </a:bodyPr>
-            <a:lstStyle/>
-            <a:p>
-              <a:pPr algn="ctr"/>
-              <a:r>
-                <a:rPr lang="en-GB" sz="2800" dirty="0"/>
-                <a:t>Energy</a:t>
-              </a:r>
-            </a:p>
-          </p:txBody>
-        </p:sp>
+              <a:ln>
+                <a:noFill/>
+              </a:ln>
+            </p:spPr>
+            <p:style>
+              <a:lnRef idx="2">
+                <a:schemeClr val="accent1">
+                  <a:shade val="50000"/>
+                </a:schemeClr>
+              </a:lnRef>
+              <a:fillRef idx="1">
+                <a:schemeClr val="accent1"/>
+              </a:fillRef>
+              <a:effectRef idx="0">
+                <a:schemeClr val="accent1"/>
+              </a:effectRef>
+              <a:fontRef idx="minor">
+                <a:schemeClr val="lt1"/>
+              </a:fontRef>
+            </p:style>
+            <p:txBody>
+              <a:bodyPr rtlCol="0" anchor="ctr"/>
+              <a:lstStyle/>
+              <a:p>
+                <a:pPr algn="ctr"/>
+                <a:endParaRPr lang="en-GB"/>
+              </a:p>
+            </p:txBody>
+          </p:sp>
+          <p:sp>
+            <p:nvSpPr>
+              <p:cNvPr id="5" name="Rechthoek 4">
+                <a:extLst>
+                  <a:ext uri="{FF2B5EF4-FFF2-40B4-BE49-F238E27FC236}">
+                    <a16:creationId xmlns:a16="http://schemas.microsoft.com/office/drawing/2014/main" id="{174595D9-1D08-B9FF-5A4F-8D6E642CB8AD}"/>
+                  </a:ext>
+                </a:extLst>
+              </p:cNvPr>
+              <p:cNvSpPr/>
+              <p:nvPr/>
+            </p:nvSpPr>
+            <p:spPr>
+              <a:xfrm>
+                <a:off x="1074656" y="4688541"/>
+                <a:ext cx="1489435" cy="51893"/>
+              </a:xfrm>
+              <a:prstGeom prst="rect">
+                <a:avLst/>
+              </a:prstGeom>
+              <a:solidFill>
+                <a:schemeClr val="tx1"/>
+              </a:solidFill>
+              <a:ln>
+                <a:noFill/>
+              </a:ln>
+            </p:spPr>
+            <p:style>
+              <a:lnRef idx="2">
+                <a:schemeClr val="accent1">
+                  <a:shade val="50000"/>
+                </a:schemeClr>
+              </a:lnRef>
+              <a:fillRef idx="1">
+                <a:schemeClr val="accent1"/>
+              </a:fillRef>
+              <a:effectRef idx="0">
+                <a:schemeClr val="accent1"/>
+              </a:effectRef>
+              <a:fontRef idx="minor">
+                <a:schemeClr val="lt1"/>
+              </a:fontRef>
+            </p:style>
+            <p:txBody>
+              <a:bodyPr rtlCol="0" anchor="ctr"/>
+              <a:lstStyle/>
+              <a:p>
+                <a:pPr algn="ctr"/>
+                <a:endParaRPr lang="en-GB"/>
+              </a:p>
+            </p:txBody>
+          </p:sp>
+          <p:sp>
+            <p:nvSpPr>
+              <p:cNvPr id="8" name="Rechthoek 7">
+                <a:extLst>
+                  <a:ext uri="{FF2B5EF4-FFF2-40B4-BE49-F238E27FC236}">
+                    <a16:creationId xmlns:a16="http://schemas.microsoft.com/office/drawing/2014/main" id="{7207E8A6-547C-E587-2E34-8AB201F6E77E}"/>
+                  </a:ext>
+                </a:extLst>
+              </p:cNvPr>
+              <p:cNvSpPr/>
+              <p:nvPr/>
+            </p:nvSpPr>
+            <p:spPr>
+              <a:xfrm>
+                <a:off x="1074656" y="4475144"/>
+                <a:ext cx="1489435" cy="51893"/>
+              </a:xfrm>
+              <a:prstGeom prst="rect">
+                <a:avLst/>
+              </a:prstGeom>
+              <a:solidFill>
+                <a:schemeClr val="tx1"/>
+              </a:solidFill>
+              <a:ln>
+                <a:noFill/>
+              </a:ln>
+            </p:spPr>
+            <p:style>
+              <a:lnRef idx="2">
+                <a:schemeClr val="accent1">
+                  <a:shade val="50000"/>
+                </a:schemeClr>
+              </a:lnRef>
+              <a:fillRef idx="1">
+                <a:schemeClr val="accent1"/>
+              </a:fillRef>
+              <a:effectRef idx="0">
+                <a:schemeClr val="accent1"/>
+              </a:effectRef>
+              <a:fontRef idx="minor">
+                <a:schemeClr val="lt1"/>
+              </a:fontRef>
+            </p:style>
+            <p:txBody>
+              <a:bodyPr rtlCol="0" anchor="ctr"/>
+              <a:lstStyle/>
+              <a:p>
+                <a:pPr algn="ctr"/>
+                <a:endParaRPr lang="en-GB"/>
+              </a:p>
+            </p:txBody>
+          </p:sp>
+          <p:sp>
+            <p:nvSpPr>
+              <p:cNvPr id="9" name="Rechthoek 8">
+                <a:extLst>
+                  <a:ext uri="{FF2B5EF4-FFF2-40B4-BE49-F238E27FC236}">
+                    <a16:creationId xmlns:a16="http://schemas.microsoft.com/office/drawing/2014/main" id="{1E732195-E83F-369A-24E1-72758A87E795}"/>
+                  </a:ext>
+                </a:extLst>
+              </p:cNvPr>
+              <p:cNvSpPr/>
+              <p:nvPr/>
+            </p:nvSpPr>
+            <p:spPr>
+              <a:xfrm>
+                <a:off x="1074655" y="4361098"/>
+                <a:ext cx="1489435" cy="51893"/>
+              </a:xfrm>
+              <a:prstGeom prst="rect">
+                <a:avLst/>
+              </a:prstGeom>
+              <a:solidFill>
+                <a:schemeClr val="tx1"/>
+              </a:solidFill>
+              <a:ln>
+                <a:noFill/>
+              </a:ln>
+            </p:spPr>
+            <p:style>
+              <a:lnRef idx="2">
+                <a:schemeClr val="accent1">
+                  <a:shade val="50000"/>
+                </a:schemeClr>
+              </a:lnRef>
+              <a:fillRef idx="1">
+                <a:schemeClr val="accent1"/>
+              </a:fillRef>
+              <a:effectRef idx="0">
+                <a:schemeClr val="accent1"/>
+              </a:effectRef>
+              <a:fontRef idx="minor">
+                <a:schemeClr val="lt1"/>
+              </a:fontRef>
+            </p:style>
+            <p:txBody>
+              <a:bodyPr rtlCol="0" anchor="ctr"/>
+              <a:lstStyle/>
+              <a:p>
+                <a:pPr algn="ctr"/>
+                <a:endParaRPr lang="en-GB"/>
+              </a:p>
+            </p:txBody>
+          </p:sp>
+          <p:cxnSp>
+            <p:nvCxnSpPr>
+              <p:cNvPr id="11" name="Rechte verbindingslijn met pijl 10">
+                <a:extLst>
+                  <a:ext uri="{FF2B5EF4-FFF2-40B4-BE49-F238E27FC236}">
+                    <a16:creationId xmlns:a16="http://schemas.microsoft.com/office/drawing/2014/main" id="{89803422-68D1-CE5A-E254-7F535D76A52E}"/>
+                  </a:ext>
+                </a:extLst>
+              </p:cNvPr>
+              <p:cNvCxnSpPr>
+                <a:cxnSpLocks/>
+              </p:cNvCxnSpPr>
+              <p:nvPr/>
+            </p:nvCxnSpPr>
+            <p:spPr>
+              <a:xfrm flipV="1">
+                <a:off x="1506070" y="3736526"/>
+                <a:ext cx="0" cy="1165412"/>
+              </a:xfrm>
+              <a:prstGeom prst="straightConnector1">
+                <a:avLst/>
+              </a:prstGeom>
+              <a:ln w="57150">
+                <a:solidFill>
+                  <a:schemeClr val="bg2">
+                    <a:lumMod val="50000"/>
+                  </a:schemeClr>
+                </a:solidFill>
+                <a:tailEnd type="triangle"/>
+              </a:ln>
+            </p:spPr>
+            <p:style>
+              <a:lnRef idx="1">
+                <a:schemeClr val="accent1"/>
+              </a:lnRef>
+              <a:fillRef idx="0">
+                <a:schemeClr val="accent1"/>
+              </a:fillRef>
+              <a:effectRef idx="0">
+                <a:schemeClr val="accent1"/>
+              </a:effectRef>
+              <a:fontRef idx="minor">
+                <a:schemeClr val="tx1"/>
+              </a:fontRef>
+            </p:style>
+          </p:cxnSp>
+          <p:cxnSp>
+            <p:nvCxnSpPr>
+              <p:cNvPr id="16" name="Rechte verbindingslijn met pijl 15">
+                <a:extLst>
+                  <a:ext uri="{FF2B5EF4-FFF2-40B4-BE49-F238E27FC236}">
+                    <a16:creationId xmlns:a16="http://schemas.microsoft.com/office/drawing/2014/main" id="{10DE7B1E-6560-12AE-FD3A-52DF2E3BB611}"/>
+                  </a:ext>
+                </a:extLst>
+              </p:cNvPr>
+              <p:cNvCxnSpPr>
+                <a:cxnSpLocks/>
+              </p:cNvCxnSpPr>
+              <p:nvPr/>
+            </p:nvCxnSpPr>
+            <p:spPr>
+              <a:xfrm flipV="1">
+                <a:off x="1506069" y="2571114"/>
+                <a:ext cx="0" cy="1165412"/>
+              </a:xfrm>
+              <a:prstGeom prst="straightConnector1">
+                <a:avLst/>
+              </a:prstGeom>
+              <a:ln w="57150">
+                <a:solidFill>
+                  <a:schemeClr val="bg2">
+                    <a:lumMod val="50000"/>
+                  </a:schemeClr>
+                </a:solidFill>
+                <a:tailEnd type="triangle"/>
+              </a:ln>
+            </p:spPr>
+            <p:style>
+              <a:lnRef idx="1">
+                <a:schemeClr val="accent1"/>
+              </a:lnRef>
+              <a:fillRef idx="0">
+                <a:schemeClr val="accent1"/>
+              </a:fillRef>
+              <a:effectRef idx="0">
+                <a:schemeClr val="accent1"/>
+              </a:effectRef>
+              <a:fontRef idx="minor">
+                <a:schemeClr val="tx1"/>
+              </a:fontRef>
+            </p:style>
+          </p:cxnSp>
+          <p:cxnSp>
+            <p:nvCxnSpPr>
+              <p:cNvPr id="17" name="Rechte verbindingslijn met pijl 16">
+                <a:extLst>
+                  <a:ext uri="{FF2B5EF4-FFF2-40B4-BE49-F238E27FC236}">
+                    <a16:creationId xmlns:a16="http://schemas.microsoft.com/office/drawing/2014/main" id="{4DFC21ED-DC79-5395-058D-BBEE61EE0A28}"/>
+                  </a:ext>
+                </a:extLst>
+              </p:cNvPr>
+              <p:cNvCxnSpPr>
+                <a:cxnSpLocks/>
+              </p:cNvCxnSpPr>
+              <p:nvPr/>
+            </p:nvCxnSpPr>
+            <p:spPr>
+              <a:xfrm flipV="1">
+                <a:off x="1515032" y="1405702"/>
+                <a:ext cx="0" cy="1165412"/>
+              </a:xfrm>
+              <a:prstGeom prst="straightConnector1">
+                <a:avLst/>
+              </a:prstGeom>
+              <a:ln w="57150">
+                <a:solidFill>
+                  <a:schemeClr val="bg2">
+                    <a:lumMod val="50000"/>
+                  </a:schemeClr>
+                </a:solidFill>
+                <a:tailEnd type="triangle"/>
+              </a:ln>
+            </p:spPr>
+            <p:style>
+              <a:lnRef idx="1">
+                <a:schemeClr val="accent1"/>
+              </a:lnRef>
+              <a:fillRef idx="0">
+                <a:schemeClr val="accent1"/>
+              </a:fillRef>
+              <a:effectRef idx="0">
+                <a:schemeClr val="accent1"/>
+              </a:effectRef>
+              <a:fontRef idx="minor">
+                <a:schemeClr val="tx1"/>
+              </a:fontRef>
+            </p:style>
+          </p:cxnSp>
+          <p:cxnSp>
+            <p:nvCxnSpPr>
+              <p:cNvPr id="20" name="Rechte verbindingslijn met pijl 19">
+                <a:extLst>
+                  <a:ext uri="{FF2B5EF4-FFF2-40B4-BE49-F238E27FC236}">
+                    <a16:creationId xmlns:a16="http://schemas.microsoft.com/office/drawing/2014/main" id="{2889345A-818B-59AA-208B-2FA8BDCF428F}"/>
+                  </a:ext>
+                </a:extLst>
+              </p:cNvPr>
+              <p:cNvCxnSpPr>
+                <a:cxnSpLocks/>
+              </p:cNvCxnSpPr>
+              <p:nvPr/>
+            </p:nvCxnSpPr>
+            <p:spPr>
+              <a:xfrm>
+                <a:off x="2151526" y="1405702"/>
+                <a:ext cx="0" cy="3496236"/>
+              </a:xfrm>
+              <a:prstGeom prst="straightConnector1">
+                <a:avLst/>
+              </a:prstGeom>
+              <a:ln w="57150">
+                <a:solidFill>
+                  <a:srgbClr val="00B050"/>
+                </a:solidFill>
+                <a:tailEnd type="triangle"/>
+              </a:ln>
+            </p:spPr>
+            <p:style>
+              <a:lnRef idx="1">
+                <a:schemeClr val="accent1"/>
+              </a:lnRef>
+              <a:fillRef idx="0">
+                <a:schemeClr val="accent1"/>
+              </a:fillRef>
+              <a:effectRef idx="0">
+                <a:schemeClr val="accent1"/>
+              </a:effectRef>
+              <a:fontRef idx="minor">
+                <a:schemeClr val="tx1"/>
+              </a:fontRef>
+            </p:style>
+          </p:cxnSp>
+          <p:cxnSp>
+            <p:nvCxnSpPr>
+              <p:cNvPr id="25" name="Rechte verbindingslijn 24">
+                <a:extLst>
+                  <a:ext uri="{FF2B5EF4-FFF2-40B4-BE49-F238E27FC236}">
+                    <a16:creationId xmlns:a16="http://schemas.microsoft.com/office/drawing/2014/main" id="{8C9DF893-910E-CE30-256B-DA9293F238CF}"/>
+                  </a:ext>
+                </a:extLst>
+              </p:cNvPr>
+              <p:cNvCxnSpPr>
+                <a:cxnSpLocks/>
+              </p:cNvCxnSpPr>
+              <p:nvPr/>
+            </p:nvCxnSpPr>
+            <p:spPr>
+              <a:xfrm>
+                <a:off x="1074655" y="1379091"/>
+                <a:ext cx="1489435" cy="0"/>
+              </a:xfrm>
+              <a:prstGeom prst="line">
+                <a:avLst/>
+              </a:prstGeom>
+              <a:ln w="57150">
+                <a:solidFill>
+                  <a:schemeClr val="tx1">
+                    <a:lumMod val="95000"/>
+                    <a:lumOff val="5000"/>
+                  </a:schemeClr>
+                </a:solidFill>
+                <a:prstDash val="dash"/>
+              </a:ln>
+            </p:spPr>
+            <p:style>
+              <a:lnRef idx="1">
+                <a:schemeClr val="accent1"/>
+              </a:lnRef>
+              <a:fillRef idx="0">
+                <a:schemeClr val="accent1"/>
+              </a:fillRef>
+              <a:effectRef idx="0">
+                <a:schemeClr val="accent1"/>
+              </a:effectRef>
+              <a:fontRef idx="minor">
+                <a:schemeClr val="tx1"/>
+              </a:fontRef>
+            </p:style>
+          </p:cxnSp>
+          <p:sp>
+            <p:nvSpPr>
+              <p:cNvPr id="28" name="Rechthoek 27">
+                <a:extLst>
+                  <a:ext uri="{FF2B5EF4-FFF2-40B4-BE49-F238E27FC236}">
+                    <a16:creationId xmlns:a16="http://schemas.microsoft.com/office/drawing/2014/main" id="{D14ECD08-9E64-46BF-8E8D-139DB6A74414}"/>
+                  </a:ext>
+                </a:extLst>
+              </p:cNvPr>
+              <p:cNvSpPr/>
+              <p:nvPr/>
+            </p:nvSpPr>
+            <p:spPr>
+              <a:xfrm>
+                <a:off x="2995505" y="4906189"/>
+                <a:ext cx="1489435" cy="188536"/>
+              </a:xfrm>
+              <a:prstGeom prst="rect">
+                <a:avLst/>
+              </a:prstGeom>
+              <a:solidFill>
+                <a:schemeClr val="tx1"/>
+              </a:solidFill>
+              <a:ln>
+                <a:noFill/>
+              </a:ln>
+            </p:spPr>
+            <p:style>
+              <a:lnRef idx="2">
+                <a:schemeClr val="accent1">
+                  <a:shade val="50000"/>
+                </a:schemeClr>
+              </a:lnRef>
+              <a:fillRef idx="1">
+                <a:schemeClr val="accent1"/>
+              </a:fillRef>
+              <a:effectRef idx="0">
+                <a:schemeClr val="accent1"/>
+              </a:effectRef>
+              <a:fontRef idx="minor">
+                <a:schemeClr val="lt1"/>
+              </a:fontRef>
+            </p:style>
+            <p:txBody>
+              <a:bodyPr rtlCol="0" anchor="ctr"/>
+              <a:lstStyle/>
+              <a:p>
+                <a:pPr algn="ctr"/>
+                <a:endParaRPr lang="en-GB"/>
+              </a:p>
+            </p:txBody>
+          </p:sp>
+          <p:sp>
+            <p:nvSpPr>
+              <p:cNvPr id="29" name="Rechthoek 28">
+                <a:extLst>
+                  <a:ext uri="{FF2B5EF4-FFF2-40B4-BE49-F238E27FC236}">
+                    <a16:creationId xmlns:a16="http://schemas.microsoft.com/office/drawing/2014/main" id="{FBC1E706-FCEC-5DE3-E358-8F0E6DE62B03}"/>
+                  </a:ext>
+                </a:extLst>
+              </p:cNvPr>
+              <p:cNvSpPr/>
+              <p:nvPr/>
+            </p:nvSpPr>
+            <p:spPr>
+              <a:xfrm>
+                <a:off x="2995505" y="4692792"/>
+                <a:ext cx="1489435" cy="51893"/>
+              </a:xfrm>
+              <a:prstGeom prst="rect">
+                <a:avLst/>
+              </a:prstGeom>
+              <a:solidFill>
+                <a:schemeClr val="tx1"/>
+              </a:solidFill>
+              <a:ln>
+                <a:noFill/>
+              </a:ln>
+            </p:spPr>
+            <p:style>
+              <a:lnRef idx="2">
+                <a:schemeClr val="accent1">
+                  <a:shade val="50000"/>
+                </a:schemeClr>
+              </a:lnRef>
+              <a:fillRef idx="1">
+                <a:schemeClr val="accent1"/>
+              </a:fillRef>
+              <a:effectRef idx="0">
+                <a:schemeClr val="accent1"/>
+              </a:effectRef>
+              <a:fontRef idx="minor">
+                <a:schemeClr val="lt1"/>
+              </a:fontRef>
+            </p:style>
+            <p:txBody>
+              <a:bodyPr rtlCol="0" anchor="ctr"/>
+              <a:lstStyle/>
+              <a:p>
+                <a:pPr algn="ctr"/>
+                <a:endParaRPr lang="en-GB"/>
+              </a:p>
+            </p:txBody>
+          </p:sp>
+          <p:sp>
+            <p:nvSpPr>
+              <p:cNvPr id="30" name="Rechthoek 29">
+                <a:extLst>
+                  <a:ext uri="{FF2B5EF4-FFF2-40B4-BE49-F238E27FC236}">
+                    <a16:creationId xmlns:a16="http://schemas.microsoft.com/office/drawing/2014/main" id="{0B3F400D-514C-C0DD-15E1-104DFADD94D0}"/>
+                  </a:ext>
+                </a:extLst>
+              </p:cNvPr>
+              <p:cNvSpPr/>
+              <p:nvPr/>
+            </p:nvSpPr>
+            <p:spPr>
+              <a:xfrm>
+                <a:off x="2995505" y="4479395"/>
+                <a:ext cx="1489435" cy="51893"/>
+              </a:xfrm>
+              <a:prstGeom prst="rect">
+                <a:avLst/>
+              </a:prstGeom>
+              <a:solidFill>
+                <a:schemeClr val="tx1"/>
+              </a:solidFill>
+              <a:ln>
+                <a:noFill/>
+              </a:ln>
+            </p:spPr>
+            <p:style>
+              <a:lnRef idx="2">
+                <a:schemeClr val="accent1">
+                  <a:shade val="50000"/>
+                </a:schemeClr>
+              </a:lnRef>
+              <a:fillRef idx="1">
+                <a:schemeClr val="accent1"/>
+              </a:fillRef>
+              <a:effectRef idx="0">
+                <a:schemeClr val="accent1"/>
+              </a:effectRef>
+              <a:fontRef idx="minor">
+                <a:schemeClr val="lt1"/>
+              </a:fontRef>
+            </p:style>
+            <p:txBody>
+              <a:bodyPr rtlCol="0" anchor="ctr"/>
+              <a:lstStyle/>
+              <a:p>
+                <a:pPr algn="ctr"/>
+                <a:endParaRPr lang="en-GB"/>
+              </a:p>
+            </p:txBody>
+          </p:sp>
+          <p:sp>
+            <p:nvSpPr>
+              <p:cNvPr id="31" name="Rechthoek 30">
+                <a:extLst>
+                  <a:ext uri="{FF2B5EF4-FFF2-40B4-BE49-F238E27FC236}">
+                    <a16:creationId xmlns:a16="http://schemas.microsoft.com/office/drawing/2014/main" id="{A5BDFF0C-F650-F726-8DAE-952B5913DACF}"/>
+                  </a:ext>
+                </a:extLst>
+              </p:cNvPr>
+              <p:cNvSpPr/>
+              <p:nvPr/>
+            </p:nvSpPr>
+            <p:spPr>
+              <a:xfrm>
+                <a:off x="2995504" y="4365349"/>
+                <a:ext cx="1489435" cy="51893"/>
+              </a:xfrm>
+              <a:prstGeom prst="rect">
+                <a:avLst/>
+              </a:prstGeom>
+              <a:solidFill>
+                <a:schemeClr val="tx1"/>
+              </a:solidFill>
+              <a:ln>
+                <a:noFill/>
+              </a:ln>
+            </p:spPr>
+            <p:style>
+              <a:lnRef idx="2">
+                <a:schemeClr val="accent1">
+                  <a:shade val="50000"/>
+                </a:schemeClr>
+              </a:lnRef>
+              <a:fillRef idx="1">
+                <a:schemeClr val="accent1"/>
+              </a:fillRef>
+              <a:effectRef idx="0">
+                <a:schemeClr val="accent1"/>
+              </a:effectRef>
+              <a:fontRef idx="minor">
+                <a:schemeClr val="lt1"/>
+              </a:fontRef>
+            </p:style>
+            <p:txBody>
+              <a:bodyPr rtlCol="0" anchor="ctr"/>
+              <a:lstStyle/>
+              <a:p>
+                <a:pPr algn="ctr"/>
+                <a:endParaRPr lang="en-GB"/>
+              </a:p>
+            </p:txBody>
+          </p:sp>
+          <p:cxnSp>
+            <p:nvCxnSpPr>
+              <p:cNvPr id="32" name="Rechte verbindingslijn met pijl 31">
+                <a:extLst>
+                  <a:ext uri="{FF2B5EF4-FFF2-40B4-BE49-F238E27FC236}">
+                    <a16:creationId xmlns:a16="http://schemas.microsoft.com/office/drawing/2014/main" id="{64905B40-E16B-6DF0-A6B1-9974DC042BE8}"/>
+                  </a:ext>
+                </a:extLst>
+              </p:cNvPr>
+              <p:cNvCxnSpPr>
+                <a:cxnSpLocks/>
+              </p:cNvCxnSpPr>
+              <p:nvPr/>
+            </p:nvCxnSpPr>
+            <p:spPr>
+              <a:xfrm flipV="1">
+                <a:off x="3426919" y="3740777"/>
+                <a:ext cx="0" cy="1165412"/>
+              </a:xfrm>
+              <a:prstGeom prst="straightConnector1">
+                <a:avLst/>
+              </a:prstGeom>
+              <a:ln w="57150">
+                <a:solidFill>
+                  <a:schemeClr val="bg2">
+                    <a:lumMod val="50000"/>
+                  </a:schemeClr>
+                </a:solidFill>
+                <a:tailEnd type="triangle"/>
+              </a:ln>
+            </p:spPr>
+            <p:style>
+              <a:lnRef idx="1">
+                <a:schemeClr val="accent1"/>
+              </a:lnRef>
+              <a:fillRef idx="0">
+                <a:schemeClr val="accent1"/>
+              </a:fillRef>
+              <a:effectRef idx="0">
+                <a:schemeClr val="accent1"/>
+              </a:effectRef>
+              <a:fontRef idx="minor">
+                <a:schemeClr val="tx1"/>
+              </a:fontRef>
+            </p:style>
+          </p:cxnSp>
+          <p:cxnSp>
+            <p:nvCxnSpPr>
+              <p:cNvPr id="33" name="Rechte verbindingslijn met pijl 32">
+                <a:extLst>
+                  <a:ext uri="{FF2B5EF4-FFF2-40B4-BE49-F238E27FC236}">
+                    <a16:creationId xmlns:a16="http://schemas.microsoft.com/office/drawing/2014/main" id="{96ECD3A9-13D6-3179-155F-258D7EB65185}"/>
+                  </a:ext>
+                </a:extLst>
+              </p:cNvPr>
+              <p:cNvCxnSpPr>
+                <a:cxnSpLocks/>
+              </p:cNvCxnSpPr>
+              <p:nvPr/>
+            </p:nvCxnSpPr>
+            <p:spPr>
+              <a:xfrm flipV="1">
+                <a:off x="3426918" y="2575365"/>
+                <a:ext cx="0" cy="1165412"/>
+              </a:xfrm>
+              <a:prstGeom prst="straightConnector1">
+                <a:avLst/>
+              </a:prstGeom>
+              <a:ln w="57150">
+                <a:solidFill>
+                  <a:schemeClr val="bg2">
+                    <a:lumMod val="50000"/>
+                  </a:schemeClr>
+                </a:solidFill>
+                <a:tailEnd type="triangle"/>
+              </a:ln>
+            </p:spPr>
+            <p:style>
+              <a:lnRef idx="1">
+                <a:schemeClr val="accent1"/>
+              </a:lnRef>
+              <a:fillRef idx="0">
+                <a:schemeClr val="accent1"/>
+              </a:fillRef>
+              <a:effectRef idx="0">
+                <a:schemeClr val="accent1"/>
+              </a:effectRef>
+              <a:fontRef idx="minor">
+                <a:schemeClr val="tx1"/>
+              </a:fontRef>
+            </p:style>
+          </p:cxnSp>
+          <p:cxnSp>
+            <p:nvCxnSpPr>
+              <p:cNvPr id="35" name="Rechte verbindingslijn met pijl 34">
+                <a:extLst>
+                  <a:ext uri="{FF2B5EF4-FFF2-40B4-BE49-F238E27FC236}">
+                    <a16:creationId xmlns:a16="http://schemas.microsoft.com/office/drawing/2014/main" id="{732CC58A-9E8F-8B17-5EA7-CF72714B41ED}"/>
+                  </a:ext>
+                </a:extLst>
+              </p:cNvPr>
+              <p:cNvCxnSpPr>
+                <a:cxnSpLocks/>
+              </p:cNvCxnSpPr>
+              <p:nvPr/>
+            </p:nvCxnSpPr>
+            <p:spPr>
+              <a:xfrm>
+                <a:off x="4072375" y="2571114"/>
+                <a:ext cx="0" cy="2335075"/>
+              </a:xfrm>
+              <a:prstGeom prst="straightConnector1">
+                <a:avLst/>
+              </a:prstGeom>
+              <a:ln w="57150">
+                <a:solidFill>
+                  <a:srgbClr val="FF0000"/>
+                </a:solidFill>
+                <a:tailEnd type="triangle"/>
+              </a:ln>
+            </p:spPr>
+            <p:style>
+              <a:lnRef idx="1">
+                <a:schemeClr val="accent1"/>
+              </a:lnRef>
+              <a:fillRef idx="0">
+                <a:schemeClr val="accent1"/>
+              </a:fillRef>
+              <a:effectRef idx="0">
+                <a:schemeClr val="accent1"/>
+              </a:effectRef>
+              <a:fontRef idx="minor">
+                <a:schemeClr val="tx1"/>
+              </a:fontRef>
+            </p:style>
+          </p:cxnSp>
+          <p:cxnSp>
+            <p:nvCxnSpPr>
+              <p:cNvPr id="36" name="Rechte verbindingslijn 35">
+                <a:extLst>
+                  <a:ext uri="{FF2B5EF4-FFF2-40B4-BE49-F238E27FC236}">
+                    <a16:creationId xmlns:a16="http://schemas.microsoft.com/office/drawing/2014/main" id="{6DBEFDBF-56F7-7D39-98AF-EAFFE81BF169}"/>
+                  </a:ext>
+                </a:extLst>
+              </p:cNvPr>
+              <p:cNvCxnSpPr>
+                <a:cxnSpLocks/>
+              </p:cNvCxnSpPr>
+              <p:nvPr/>
+            </p:nvCxnSpPr>
+            <p:spPr>
+              <a:xfrm>
+                <a:off x="2995504" y="2544219"/>
+                <a:ext cx="1489435" cy="0"/>
+              </a:xfrm>
+              <a:prstGeom prst="line">
+                <a:avLst/>
+              </a:prstGeom>
+              <a:ln w="57150">
+                <a:solidFill>
+                  <a:schemeClr val="tx1">
+                    <a:lumMod val="95000"/>
+                    <a:lumOff val="5000"/>
+                  </a:schemeClr>
+                </a:solidFill>
+                <a:prstDash val="dash"/>
+              </a:ln>
+            </p:spPr>
+            <p:style>
+              <a:lnRef idx="1">
+                <a:schemeClr val="accent1"/>
+              </a:lnRef>
+              <a:fillRef idx="0">
+                <a:schemeClr val="accent1"/>
+              </a:fillRef>
+              <a:effectRef idx="0">
+                <a:schemeClr val="accent1"/>
+              </a:effectRef>
+              <a:fontRef idx="minor">
+                <a:schemeClr val="tx1"/>
+              </a:fontRef>
+            </p:style>
+          </p:cxnSp>
+          <p:sp>
+            <p:nvSpPr>
+              <p:cNvPr id="39" name="Rechthoek 38">
+                <a:extLst>
+                  <a:ext uri="{FF2B5EF4-FFF2-40B4-BE49-F238E27FC236}">
+                    <a16:creationId xmlns:a16="http://schemas.microsoft.com/office/drawing/2014/main" id="{1ACF17E0-3161-EDB5-2111-96197241CA49}"/>
+                  </a:ext>
+                </a:extLst>
+              </p:cNvPr>
+              <p:cNvSpPr/>
+              <p:nvPr/>
+            </p:nvSpPr>
+            <p:spPr>
+              <a:xfrm>
+                <a:off x="4916352" y="4901938"/>
+                <a:ext cx="1489435" cy="188536"/>
+              </a:xfrm>
+              <a:prstGeom prst="rect">
+                <a:avLst/>
+              </a:prstGeom>
+              <a:solidFill>
+                <a:schemeClr val="tx1"/>
+              </a:solidFill>
+              <a:ln>
+                <a:noFill/>
+              </a:ln>
+            </p:spPr>
+            <p:style>
+              <a:lnRef idx="2">
+                <a:schemeClr val="accent1">
+                  <a:shade val="50000"/>
+                </a:schemeClr>
+              </a:lnRef>
+              <a:fillRef idx="1">
+                <a:schemeClr val="accent1"/>
+              </a:fillRef>
+              <a:effectRef idx="0">
+                <a:schemeClr val="accent1"/>
+              </a:effectRef>
+              <a:fontRef idx="minor">
+                <a:schemeClr val="lt1"/>
+              </a:fontRef>
+            </p:style>
+            <p:txBody>
+              <a:bodyPr rtlCol="0" anchor="ctr"/>
+              <a:lstStyle/>
+              <a:p>
+                <a:pPr algn="ctr"/>
+                <a:endParaRPr lang="en-GB"/>
+              </a:p>
+            </p:txBody>
+          </p:sp>
+          <p:sp>
+            <p:nvSpPr>
+              <p:cNvPr id="40" name="Rechthoek 39">
+                <a:extLst>
+                  <a:ext uri="{FF2B5EF4-FFF2-40B4-BE49-F238E27FC236}">
+                    <a16:creationId xmlns:a16="http://schemas.microsoft.com/office/drawing/2014/main" id="{BD5C2EEC-7D9D-36B2-2034-67E0F73EE262}"/>
+                  </a:ext>
+                </a:extLst>
+              </p:cNvPr>
+              <p:cNvSpPr/>
+              <p:nvPr/>
+            </p:nvSpPr>
+            <p:spPr>
+              <a:xfrm>
+                <a:off x="4916352" y="4688541"/>
+                <a:ext cx="1489435" cy="51893"/>
+              </a:xfrm>
+              <a:prstGeom prst="rect">
+                <a:avLst/>
+              </a:prstGeom>
+              <a:solidFill>
+                <a:schemeClr val="tx1"/>
+              </a:solidFill>
+              <a:ln>
+                <a:noFill/>
+              </a:ln>
+            </p:spPr>
+            <p:style>
+              <a:lnRef idx="2">
+                <a:schemeClr val="accent1">
+                  <a:shade val="50000"/>
+                </a:schemeClr>
+              </a:lnRef>
+              <a:fillRef idx="1">
+                <a:schemeClr val="accent1"/>
+              </a:fillRef>
+              <a:effectRef idx="0">
+                <a:schemeClr val="accent1"/>
+              </a:effectRef>
+              <a:fontRef idx="minor">
+                <a:schemeClr val="lt1"/>
+              </a:fontRef>
+            </p:style>
+            <p:txBody>
+              <a:bodyPr rtlCol="0" anchor="ctr"/>
+              <a:lstStyle/>
+              <a:p>
+                <a:pPr algn="ctr"/>
+                <a:endParaRPr lang="en-GB"/>
+              </a:p>
+            </p:txBody>
+          </p:sp>
+          <p:sp>
+            <p:nvSpPr>
+              <p:cNvPr id="41" name="Rechthoek 40">
+                <a:extLst>
+                  <a:ext uri="{FF2B5EF4-FFF2-40B4-BE49-F238E27FC236}">
+                    <a16:creationId xmlns:a16="http://schemas.microsoft.com/office/drawing/2014/main" id="{12AFCEDC-41C3-B583-C415-5C253D473896}"/>
+                  </a:ext>
+                </a:extLst>
+              </p:cNvPr>
+              <p:cNvSpPr/>
+              <p:nvPr/>
+            </p:nvSpPr>
+            <p:spPr>
+              <a:xfrm>
+                <a:off x="4916352" y="4475144"/>
+                <a:ext cx="1489435" cy="51893"/>
+              </a:xfrm>
+              <a:prstGeom prst="rect">
+                <a:avLst/>
+              </a:prstGeom>
+              <a:solidFill>
+                <a:schemeClr val="tx1"/>
+              </a:solidFill>
+              <a:ln>
+                <a:noFill/>
+              </a:ln>
+            </p:spPr>
+            <p:style>
+              <a:lnRef idx="2">
+                <a:schemeClr val="accent1">
+                  <a:shade val="50000"/>
+                </a:schemeClr>
+              </a:lnRef>
+              <a:fillRef idx="1">
+                <a:schemeClr val="accent1"/>
+              </a:fillRef>
+              <a:effectRef idx="0">
+                <a:schemeClr val="accent1"/>
+              </a:effectRef>
+              <a:fontRef idx="minor">
+                <a:schemeClr val="lt1"/>
+              </a:fontRef>
+            </p:style>
+            <p:txBody>
+              <a:bodyPr rtlCol="0" anchor="ctr"/>
+              <a:lstStyle/>
+              <a:p>
+                <a:pPr algn="ctr"/>
+                <a:endParaRPr lang="en-GB"/>
+              </a:p>
+            </p:txBody>
+          </p:sp>
+          <p:sp>
+            <p:nvSpPr>
+              <p:cNvPr id="42" name="Rechthoek 41">
+                <a:extLst>
+                  <a:ext uri="{FF2B5EF4-FFF2-40B4-BE49-F238E27FC236}">
+                    <a16:creationId xmlns:a16="http://schemas.microsoft.com/office/drawing/2014/main" id="{4A63B4DA-C375-1668-3364-ACC34598FF41}"/>
+                  </a:ext>
+                </a:extLst>
+              </p:cNvPr>
+              <p:cNvSpPr/>
+              <p:nvPr/>
+            </p:nvSpPr>
+            <p:spPr>
+              <a:xfrm>
+                <a:off x="4916351" y="4361098"/>
+                <a:ext cx="1489435" cy="51893"/>
+              </a:xfrm>
+              <a:prstGeom prst="rect">
+                <a:avLst/>
+              </a:prstGeom>
+              <a:solidFill>
+                <a:schemeClr val="tx1"/>
+              </a:solidFill>
+              <a:ln>
+                <a:noFill/>
+              </a:ln>
+            </p:spPr>
+            <p:style>
+              <a:lnRef idx="2">
+                <a:schemeClr val="accent1">
+                  <a:shade val="50000"/>
+                </a:schemeClr>
+              </a:lnRef>
+              <a:fillRef idx="1">
+                <a:schemeClr val="accent1"/>
+              </a:fillRef>
+              <a:effectRef idx="0">
+                <a:schemeClr val="accent1"/>
+              </a:effectRef>
+              <a:fontRef idx="minor">
+                <a:schemeClr val="lt1"/>
+              </a:fontRef>
+            </p:style>
+            <p:txBody>
+              <a:bodyPr rtlCol="0" anchor="ctr"/>
+              <a:lstStyle/>
+              <a:p>
+                <a:pPr algn="ctr"/>
+                <a:endParaRPr lang="en-GB"/>
+              </a:p>
+            </p:txBody>
+          </p:sp>
+          <p:cxnSp>
+            <p:nvCxnSpPr>
+              <p:cNvPr id="43" name="Rechte verbindingslijn met pijl 42">
+                <a:extLst>
+                  <a:ext uri="{FF2B5EF4-FFF2-40B4-BE49-F238E27FC236}">
+                    <a16:creationId xmlns:a16="http://schemas.microsoft.com/office/drawing/2014/main" id="{96B256EE-3146-8DE0-D8DE-42486DB39EC1}"/>
+                  </a:ext>
+                </a:extLst>
+              </p:cNvPr>
+              <p:cNvCxnSpPr>
+                <a:cxnSpLocks/>
+              </p:cNvCxnSpPr>
+              <p:nvPr/>
+            </p:nvCxnSpPr>
+            <p:spPr>
+              <a:xfrm flipV="1">
+                <a:off x="5347766" y="3736526"/>
+                <a:ext cx="0" cy="1165412"/>
+              </a:xfrm>
+              <a:prstGeom prst="straightConnector1">
+                <a:avLst/>
+              </a:prstGeom>
+              <a:ln w="57150">
+                <a:solidFill>
+                  <a:schemeClr val="bg2">
+                    <a:lumMod val="50000"/>
+                  </a:schemeClr>
+                </a:solidFill>
+                <a:tailEnd type="triangle"/>
+              </a:ln>
+            </p:spPr>
+            <p:style>
+              <a:lnRef idx="1">
+                <a:schemeClr val="accent1"/>
+              </a:lnRef>
+              <a:fillRef idx="0">
+                <a:schemeClr val="accent1"/>
+              </a:fillRef>
+              <a:effectRef idx="0">
+                <a:schemeClr val="accent1"/>
+              </a:effectRef>
+              <a:fontRef idx="minor">
+                <a:schemeClr val="tx1"/>
+              </a:fontRef>
+            </p:style>
+          </p:cxnSp>
+          <p:cxnSp>
+            <p:nvCxnSpPr>
+              <p:cNvPr id="44" name="Rechte verbindingslijn met pijl 43">
+                <a:extLst>
+                  <a:ext uri="{FF2B5EF4-FFF2-40B4-BE49-F238E27FC236}">
+                    <a16:creationId xmlns:a16="http://schemas.microsoft.com/office/drawing/2014/main" id="{150B94DC-077F-96A0-A08C-6D20ACA383B3}"/>
+                  </a:ext>
+                </a:extLst>
+              </p:cNvPr>
+              <p:cNvCxnSpPr>
+                <a:cxnSpLocks/>
+              </p:cNvCxnSpPr>
+              <p:nvPr/>
+            </p:nvCxnSpPr>
+            <p:spPr>
+              <a:xfrm flipV="1">
+                <a:off x="5347765" y="2571114"/>
+                <a:ext cx="0" cy="1165412"/>
+              </a:xfrm>
+              <a:prstGeom prst="straightConnector1">
+                <a:avLst/>
+              </a:prstGeom>
+              <a:ln w="57150">
+                <a:solidFill>
+                  <a:schemeClr val="bg2">
+                    <a:lumMod val="50000"/>
+                  </a:schemeClr>
+                </a:solidFill>
+                <a:tailEnd type="triangle"/>
+              </a:ln>
+            </p:spPr>
+            <p:style>
+              <a:lnRef idx="1">
+                <a:schemeClr val="accent1"/>
+              </a:lnRef>
+              <a:fillRef idx="0">
+                <a:schemeClr val="accent1"/>
+              </a:fillRef>
+              <a:effectRef idx="0">
+                <a:schemeClr val="accent1"/>
+              </a:effectRef>
+              <a:fontRef idx="minor">
+                <a:schemeClr val="tx1"/>
+              </a:fontRef>
+            </p:style>
+          </p:cxnSp>
+          <p:cxnSp>
+            <p:nvCxnSpPr>
+              <p:cNvPr id="45" name="Rechte verbindingslijn met pijl 44">
+                <a:extLst>
+                  <a:ext uri="{FF2B5EF4-FFF2-40B4-BE49-F238E27FC236}">
+                    <a16:creationId xmlns:a16="http://schemas.microsoft.com/office/drawing/2014/main" id="{EB3BB69C-07A0-BDBC-50E3-DE0E9A8FABA7}"/>
+                  </a:ext>
+                </a:extLst>
+              </p:cNvPr>
+              <p:cNvCxnSpPr>
+                <a:cxnSpLocks/>
+              </p:cNvCxnSpPr>
+              <p:nvPr/>
+            </p:nvCxnSpPr>
+            <p:spPr>
+              <a:xfrm>
+                <a:off x="5993222" y="2880627"/>
+                <a:ext cx="0" cy="2021311"/>
+              </a:xfrm>
+              <a:prstGeom prst="straightConnector1">
+                <a:avLst/>
+              </a:prstGeom>
+              <a:ln w="57150">
+                <a:solidFill>
+                  <a:srgbClr val="0070C0"/>
+                </a:solidFill>
+                <a:tailEnd type="triangle"/>
+              </a:ln>
+            </p:spPr>
+            <p:style>
+              <a:lnRef idx="1">
+                <a:schemeClr val="accent1"/>
+              </a:lnRef>
+              <a:fillRef idx="0">
+                <a:schemeClr val="accent1"/>
+              </a:fillRef>
+              <a:effectRef idx="0">
+                <a:schemeClr val="accent1"/>
+              </a:effectRef>
+              <a:fontRef idx="minor">
+                <a:schemeClr val="tx1"/>
+              </a:fontRef>
+            </p:style>
+          </p:cxnSp>
+          <p:cxnSp>
+            <p:nvCxnSpPr>
+              <p:cNvPr id="49" name="Rechte verbindingslijn met pijl 48">
+                <a:extLst>
+                  <a:ext uri="{FF2B5EF4-FFF2-40B4-BE49-F238E27FC236}">
+                    <a16:creationId xmlns:a16="http://schemas.microsoft.com/office/drawing/2014/main" id="{C679ABFB-0C69-98C4-232E-ADC69710A336}"/>
+                  </a:ext>
+                </a:extLst>
+              </p:cNvPr>
+              <p:cNvCxnSpPr>
+                <a:cxnSpLocks/>
+              </p:cNvCxnSpPr>
+              <p:nvPr/>
+            </p:nvCxnSpPr>
+            <p:spPr>
+              <a:xfrm>
+                <a:off x="5347764" y="2571114"/>
+                <a:ext cx="645458" cy="225874"/>
+              </a:xfrm>
+              <a:prstGeom prst="straightConnector1">
+                <a:avLst/>
+              </a:prstGeom>
+              <a:ln w="38100">
+                <a:solidFill>
+                  <a:schemeClr val="tx1"/>
+                </a:solidFill>
+                <a:prstDash val="solid"/>
+                <a:tailEnd type="triangle"/>
+              </a:ln>
+            </p:spPr>
+            <p:style>
+              <a:lnRef idx="1">
+                <a:schemeClr val="accent1"/>
+              </a:lnRef>
+              <a:fillRef idx="0">
+                <a:schemeClr val="accent1"/>
+              </a:fillRef>
+              <a:effectRef idx="0">
+                <a:schemeClr val="accent1"/>
+              </a:effectRef>
+              <a:fontRef idx="minor">
+                <a:schemeClr val="tx1"/>
+              </a:fontRef>
+            </p:style>
+          </p:cxnSp>
+          <p:sp>
+            <p:nvSpPr>
+              <p:cNvPr id="52" name="Tekstvak 51">
+                <a:extLst>
+                  <a:ext uri="{FF2B5EF4-FFF2-40B4-BE49-F238E27FC236}">
+                    <a16:creationId xmlns:a16="http://schemas.microsoft.com/office/drawing/2014/main" id="{EE39DF1A-646F-3D3C-E04E-573F2ED293A4}"/>
+                  </a:ext>
+                </a:extLst>
+              </p:cNvPr>
+              <p:cNvSpPr txBox="1"/>
+              <p:nvPr/>
+            </p:nvSpPr>
+            <p:spPr>
+              <a:xfrm>
+                <a:off x="1438743" y="5093108"/>
+                <a:ext cx="721672" cy="461665"/>
+              </a:xfrm>
+              <a:prstGeom prst="rect">
+                <a:avLst/>
+              </a:prstGeom>
+              <a:noFill/>
+            </p:spPr>
+            <p:txBody>
+              <a:bodyPr wrap="none" rtlCol="0">
+                <a:spAutoFit/>
+              </a:bodyPr>
+              <a:lstStyle/>
+              <a:p>
+                <a:pPr algn="ctr"/>
+                <a:r>
+                  <a:rPr lang="en-GB" sz="2400" dirty="0"/>
+                  <a:t>THG</a:t>
+                </a:r>
+              </a:p>
+            </p:txBody>
+          </p:sp>
+          <p:sp>
+            <p:nvSpPr>
+              <p:cNvPr id="53" name="Tekstvak 52">
+                <a:extLst>
+                  <a:ext uri="{FF2B5EF4-FFF2-40B4-BE49-F238E27FC236}">
+                    <a16:creationId xmlns:a16="http://schemas.microsoft.com/office/drawing/2014/main" id="{94FA0A05-68E3-AB9B-5971-B6CDD2DC7BE4}"/>
+                  </a:ext>
+                </a:extLst>
+              </p:cNvPr>
+              <p:cNvSpPr txBox="1"/>
+              <p:nvPr/>
+            </p:nvSpPr>
+            <p:spPr>
+              <a:xfrm>
+                <a:off x="3400784" y="5093108"/>
+                <a:ext cx="712054" cy="461665"/>
+              </a:xfrm>
+              <a:prstGeom prst="rect">
+                <a:avLst/>
+              </a:prstGeom>
+              <a:noFill/>
+            </p:spPr>
+            <p:txBody>
+              <a:bodyPr wrap="none" rtlCol="0">
+                <a:spAutoFit/>
+              </a:bodyPr>
+              <a:lstStyle/>
+              <a:p>
+                <a:pPr algn="ctr"/>
+                <a:r>
+                  <a:rPr lang="en-GB" sz="2400" dirty="0"/>
+                  <a:t>SHG</a:t>
+                </a:r>
+              </a:p>
+            </p:txBody>
+          </p:sp>
+          <p:sp>
+            <p:nvSpPr>
+              <p:cNvPr id="54" name="Tekstvak 53">
+                <a:extLst>
+                  <a:ext uri="{FF2B5EF4-FFF2-40B4-BE49-F238E27FC236}">
+                    <a16:creationId xmlns:a16="http://schemas.microsoft.com/office/drawing/2014/main" id="{33CBE124-3E17-6FB8-E5BE-70FAE679E096}"/>
+                  </a:ext>
+                </a:extLst>
+              </p:cNvPr>
+              <p:cNvSpPr txBox="1"/>
+              <p:nvPr/>
+            </p:nvSpPr>
+            <p:spPr>
+              <a:xfrm>
+                <a:off x="5271622" y="5090474"/>
+                <a:ext cx="790602" cy="461665"/>
+              </a:xfrm>
+              <a:prstGeom prst="rect">
+                <a:avLst/>
+              </a:prstGeom>
+              <a:noFill/>
+            </p:spPr>
+            <p:txBody>
+              <a:bodyPr wrap="none" rtlCol="0">
+                <a:spAutoFit/>
+              </a:bodyPr>
+              <a:lstStyle/>
+              <a:p>
+                <a:pPr algn="ctr"/>
+                <a:r>
+                  <a:rPr lang="en-GB" sz="2400" dirty="0"/>
+                  <a:t>2PEF</a:t>
+                </a:r>
+                <a:endParaRPr lang="en-GB" dirty="0"/>
+              </a:p>
+            </p:txBody>
+          </p:sp>
+          <p:cxnSp>
+            <p:nvCxnSpPr>
+              <p:cNvPr id="56" name="Rechte verbindingslijn met pijl 55">
+                <a:extLst>
+                  <a:ext uri="{FF2B5EF4-FFF2-40B4-BE49-F238E27FC236}">
+                    <a16:creationId xmlns:a16="http://schemas.microsoft.com/office/drawing/2014/main" id="{FF7FE3C6-5E38-F10D-9008-4C3B92EAD230}"/>
+                  </a:ext>
+                </a:extLst>
+              </p:cNvPr>
+              <p:cNvCxnSpPr>
+                <a:cxnSpLocks/>
+              </p:cNvCxnSpPr>
+              <p:nvPr/>
+            </p:nvCxnSpPr>
+            <p:spPr>
+              <a:xfrm flipV="1">
+                <a:off x="753035" y="1246094"/>
+                <a:ext cx="0" cy="3844380"/>
+              </a:xfrm>
+              <a:prstGeom prst="straightConnector1">
+                <a:avLst/>
+              </a:prstGeom>
+              <a:ln w="57150">
+                <a:solidFill>
+                  <a:schemeClr val="tx1"/>
+                </a:solidFill>
+                <a:tailEnd type="triangle"/>
+              </a:ln>
+            </p:spPr>
+            <p:style>
+              <a:lnRef idx="1">
+                <a:schemeClr val="accent1"/>
+              </a:lnRef>
+              <a:fillRef idx="0">
+                <a:schemeClr val="accent1"/>
+              </a:fillRef>
+              <a:effectRef idx="0">
+                <a:schemeClr val="accent1"/>
+              </a:effectRef>
+              <a:fontRef idx="minor">
+                <a:schemeClr val="tx1"/>
+              </a:fontRef>
+            </p:style>
+          </p:cxnSp>
+          <p:sp>
+            <p:nvSpPr>
+              <p:cNvPr id="58" name="Tekstvak 57">
+                <a:extLst>
+                  <a:ext uri="{FF2B5EF4-FFF2-40B4-BE49-F238E27FC236}">
+                    <a16:creationId xmlns:a16="http://schemas.microsoft.com/office/drawing/2014/main" id="{4D2CEB3E-D1E6-153F-A615-1527AFBA22D2}"/>
+                  </a:ext>
+                </a:extLst>
+              </p:cNvPr>
+              <p:cNvSpPr txBox="1"/>
+              <p:nvPr/>
+            </p:nvSpPr>
+            <p:spPr>
+              <a:xfrm rot="16200000">
+                <a:off x="-187917" y="3021813"/>
+                <a:ext cx="1176797" cy="523220"/>
+              </a:xfrm>
+              <a:prstGeom prst="rect">
+                <a:avLst/>
+              </a:prstGeom>
+              <a:noFill/>
+            </p:spPr>
+            <p:txBody>
+              <a:bodyPr wrap="none" rtlCol="0">
+                <a:spAutoFit/>
+              </a:bodyPr>
+              <a:lstStyle/>
+              <a:p>
+                <a:pPr algn="ctr"/>
+                <a:r>
+                  <a:rPr lang="en-GB" sz="2800" dirty="0"/>
+                  <a:t>Energy</a:t>
+                </a:r>
+              </a:p>
+            </p:txBody>
+          </p:sp>
+        </p:grpSp>
       </p:grpSp>
     </p:spTree>
     <p:extLst>

</xml_diff>